<commit_message>
Edit section 1.2 challenges and images
</commit_message>
<xml_diff>
--- a/episodes/fig/1.2 figs.pptx
+++ b/episodes/fig/1.2 figs.pptx
@@ -5,7 +5,7 @@
     <p:sldMasterId id="2147483648" r:id="rId1"/>
   </p:sldMasterIdLst>
   <p:notesMasterIdLst>
-    <p:notesMasterId r:id="rId9"/>
+    <p:notesMasterId r:id="rId12"/>
   </p:notesMasterIdLst>
   <p:sldIdLst>
     <p:sldId id="256" r:id="rId2"/>
@@ -15,6 +15,9 @@
     <p:sldId id="260" r:id="rId6"/>
     <p:sldId id="261" r:id="rId7"/>
     <p:sldId id="263" r:id="rId8"/>
+    <p:sldId id="266" r:id="rId9"/>
+    <p:sldId id="265" r:id="rId10"/>
+    <p:sldId id="264" r:id="rId11"/>
   </p:sldIdLst>
   <p:sldSz cx="12192000" cy="6858000"/>
   <p:notesSz cx="6858000" cy="9144000"/>
@@ -113,6 +116,11 @@
       </a:defRPr>
     </a:lvl9pPr>
   </p:defaultTextStyle>
+  <p:extLst>
+    <p:ext uri="{EFAFB233-063F-42B5-8137-9DF3F51BA10A}">
+      <p15:sldGuideLst xmlns:p15="http://schemas.microsoft.com/office/powerpoint/2012/main"/>
+    </p:ext>
+  </p:extLst>
 </p:presentation>
 </file>
 
@@ -3682,7 +3690,7 @@
           <a:p>
             <a:fld id="{32718764-ABCD-4AE3-A91F-DC71DA5ECAE5}" type="datetimeFigureOut">
               <a:rPr lang="en-GB" smtClean="0"/>
-              <a:t>22/05/2025</a:t>
+              <a:t>23/05/2025</a:t>
             </a:fld>
             <a:endParaRPr lang="en-GB"/>
           </a:p>
@@ -4452,7 +4460,7 @@
           <a:p>
             <a:fld id="{427D9A9F-7677-446C-83D1-3EA33DDA4AAE}" type="datetimeFigureOut">
               <a:rPr lang="en-GB" smtClean="0"/>
-              <a:t>22/05/2025</a:t>
+              <a:t>23/05/2025</a:t>
             </a:fld>
             <a:endParaRPr lang="en-GB"/>
           </a:p>
@@ -4652,7 +4660,7 @@
           <a:p>
             <a:fld id="{427D9A9F-7677-446C-83D1-3EA33DDA4AAE}" type="datetimeFigureOut">
               <a:rPr lang="en-GB" smtClean="0"/>
-              <a:t>22/05/2025</a:t>
+              <a:t>23/05/2025</a:t>
             </a:fld>
             <a:endParaRPr lang="en-GB"/>
           </a:p>
@@ -4862,7 +4870,7 @@
           <a:p>
             <a:fld id="{427D9A9F-7677-446C-83D1-3EA33DDA4AAE}" type="datetimeFigureOut">
               <a:rPr lang="en-GB" smtClean="0"/>
-              <a:t>22/05/2025</a:t>
+              <a:t>23/05/2025</a:t>
             </a:fld>
             <a:endParaRPr lang="en-GB"/>
           </a:p>
@@ -5062,7 +5070,7 @@
           <a:p>
             <a:fld id="{427D9A9F-7677-446C-83D1-3EA33DDA4AAE}" type="datetimeFigureOut">
               <a:rPr lang="en-GB" smtClean="0"/>
-              <a:t>22/05/2025</a:t>
+              <a:t>23/05/2025</a:t>
             </a:fld>
             <a:endParaRPr lang="en-GB"/>
           </a:p>
@@ -5338,7 +5346,7 @@
           <a:p>
             <a:fld id="{427D9A9F-7677-446C-83D1-3EA33DDA4AAE}" type="datetimeFigureOut">
               <a:rPr lang="en-GB" smtClean="0"/>
-              <a:t>22/05/2025</a:t>
+              <a:t>23/05/2025</a:t>
             </a:fld>
             <a:endParaRPr lang="en-GB"/>
           </a:p>
@@ -5606,7 +5614,7 @@
           <a:p>
             <a:fld id="{427D9A9F-7677-446C-83D1-3EA33DDA4AAE}" type="datetimeFigureOut">
               <a:rPr lang="en-GB" smtClean="0"/>
-              <a:t>22/05/2025</a:t>
+              <a:t>23/05/2025</a:t>
             </a:fld>
             <a:endParaRPr lang="en-GB"/>
           </a:p>
@@ -6021,7 +6029,7 @@
           <a:p>
             <a:fld id="{427D9A9F-7677-446C-83D1-3EA33DDA4AAE}" type="datetimeFigureOut">
               <a:rPr lang="en-GB" smtClean="0"/>
-              <a:t>22/05/2025</a:t>
+              <a:t>23/05/2025</a:t>
             </a:fld>
             <a:endParaRPr lang="en-GB"/>
           </a:p>
@@ -6163,7 +6171,7 @@
           <a:p>
             <a:fld id="{427D9A9F-7677-446C-83D1-3EA33DDA4AAE}" type="datetimeFigureOut">
               <a:rPr lang="en-GB" smtClean="0"/>
-              <a:t>22/05/2025</a:t>
+              <a:t>23/05/2025</a:t>
             </a:fld>
             <a:endParaRPr lang="en-GB"/>
           </a:p>
@@ -6276,7 +6284,7 @@
           <a:p>
             <a:fld id="{427D9A9F-7677-446C-83D1-3EA33DDA4AAE}" type="datetimeFigureOut">
               <a:rPr lang="en-GB" smtClean="0"/>
-              <a:t>22/05/2025</a:t>
+              <a:t>23/05/2025</a:t>
             </a:fld>
             <a:endParaRPr lang="en-GB"/>
           </a:p>
@@ -6589,7 +6597,7 @@
           <a:p>
             <a:fld id="{427D9A9F-7677-446C-83D1-3EA33DDA4AAE}" type="datetimeFigureOut">
               <a:rPr lang="en-GB" smtClean="0"/>
-              <a:t>22/05/2025</a:t>
+              <a:t>23/05/2025</a:t>
             </a:fld>
             <a:endParaRPr lang="en-GB"/>
           </a:p>
@@ -6878,7 +6886,7 @@
           <a:p>
             <a:fld id="{427D9A9F-7677-446C-83D1-3EA33DDA4AAE}" type="datetimeFigureOut">
               <a:rPr lang="en-GB" smtClean="0"/>
-              <a:t>22/05/2025</a:t>
+              <a:t>23/05/2025</a:t>
             </a:fld>
             <a:endParaRPr lang="en-GB"/>
           </a:p>
@@ -7121,7 +7129,7 @@
           <a:p>
             <a:fld id="{427D9A9F-7677-446C-83D1-3EA33DDA4AAE}" type="datetimeFigureOut">
               <a:rPr lang="en-GB" smtClean="0"/>
-              <a:t>22/05/2025</a:t>
+              <a:t>23/05/2025</a:t>
             </a:fld>
             <a:endParaRPr lang="en-GB"/>
           </a:p>
@@ -7592,6 +7600,3529 @@
     <p:extLst>
       <p:ext uri="{BB962C8B-B14F-4D97-AF65-F5344CB8AC3E}">
         <p14:creationId xmlns:p14="http://schemas.microsoft.com/office/powerpoint/2010/main" val="3767641242"/>
+      </p:ext>
+    </p:extLst>
+  </p:cSld>
+  <p:clrMapOvr>
+    <a:masterClrMapping/>
+  </p:clrMapOvr>
+</p:sld>
+</file>
+
+<file path=ppt/slides/slide10.xml><?xml version="1.0" encoding="utf-8"?>
+<p:sld xmlns:a="http://schemas.openxmlformats.org/drawingml/2006/main" xmlns:r="http://schemas.openxmlformats.org/officeDocument/2006/relationships" xmlns:p="http://schemas.openxmlformats.org/presentationml/2006/main">
+  <p:cSld>
+    <p:spTree>
+      <p:nvGrpSpPr>
+        <p:cNvPr id="1" name=""/>
+        <p:cNvGrpSpPr/>
+        <p:nvPr/>
+      </p:nvGrpSpPr>
+      <p:grpSpPr>
+        <a:xfrm>
+          <a:off x="0" y="0"/>
+          <a:ext cx="0" cy="0"/>
+          <a:chOff x="0" y="0"/>
+          <a:chExt cx="0" cy="0"/>
+        </a:xfrm>
+      </p:grpSpPr>
+      <p:grpSp>
+        <p:nvGrpSpPr>
+          <p:cNvPr id="3" name="Group 2">
+            <a:extLst>
+              <a:ext uri="{FF2B5EF4-FFF2-40B4-BE49-F238E27FC236}">
+                <a16:creationId xmlns:a16="http://schemas.microsoft.com/office/drawing/2014/main" id="{BFDDC81C-0AB2-EC24-4E81-EFB356503C1A}"/>
+              </a:ext>
+            </a:extLst>
+          </p:cNvPr>
+          <p:cNvGrpSpPr/>
+          <p:nvPr/>
+        </p:nvGrpSpPr>
+        <p:grpSpPr>
+          <a:xfrm>
+            <a:off x="986783" y="1175409"/>
+            <a:ext cx="10218435" cy="4935402"/>
+            <a:chOff x="415698" y="899809"/>
+            <a:chExt cx="8194650" cy="3957934"/>
+          </a:xfrm>
+        </p:grpSpPr>
+        <p:grpSp>
+          <p:nvGrpSpPr>
+            <p:cNvPr id="4" name="Google Shape;112;p18">
+              <a:extLst>
+                <a:ext uri="{FF2B5EF4-FFF2-40B4-BE49-F238E27FC236}">
+                  <a16:creationId xmlns:a16="http://schemas.microsoft.com/office/drawing/2014/main" id="{C70F9491-D945-AB4A-263F-6CC3F88F3696}"/>
+                </a:ext>
+              </a:extLst>
+            </p:cNvPr>
+            <p:cNvGrpSpPr/>
+            <p:nvPr/>
+          </p:nvGrpSpPr>
+          <p:grpSpPr>
+            <a:xfrm>
+              <a:off x="415698" y="4018475"/>
+              <a:ext cx="2079600" cy="839268"/>
+              <a:chOff x="415698" y="4018475"/>
+              <a:chExt cx="2079600" cy="839268"/>
+            </a:xfrm>
+          </p:grpSpPr>
+          <p:sp>
+            <p:nvSpPr>
+              <p:cNvPr id="40" name="Google Shape;113;p18">
+                <a:extLst>
+                  <a:ext uri="{FF2B5EF4-FFF2-40B4-BE49-F238E27FC236}">
+                    <a16:creationId xmlns:a16="http://schemas.microsoft.com/office/drawing/2014/main" id="{F8B1310C-09D5-E575-C0BB-1907418787CE}"/>
+                  </a:ext>
+                </a:extLst>
+              </p:cNvPr>
+              <p:cNvSpPr txBox="1"/>
+              <p:nvPr/>
+            </p:nvSpPr>
+            <p:spPr>
+              <a:xfrm>
+                <a:off x="415698" y="4267643"/>
+                <a:ext cx="2079600" cy="590100"/>
+              </a:xfrm>
+              <a:prstGeom prst="rect">
+                <a:avLst/>
+              </a:prstGeom>
+              <a:noFill/>
+              <a:ln>
+                <a:noFill/>
+              </a:ln>
+            </p:spPr>
+            <p:txBody>
+              <a:bodyPr spcFirstLastPara="1" wrap="square" lIns="91425" tIns="91425" rIns="91425" bIns="91425" anchor="ctr" anchorCtr="0">
+                <a:noAutofit/>
+              </a:bodyPr>
+              <a:lstStyle/>
+              <a:p>
+                <a:pPr lvl="0" algn="ctr">
+                  <a:lnSpc>
+                    <a:spcPct val="110000"/>
+                  </a:lnSpc>
+                </a:pPr>
+                <a:r>
+                  <a:rPr lang="en-US" sz="1400" dirty="0">
+                    <a:latin typeface="Roboto" pitchFamily="2" charset="0"/>
+                    <a:ea typeface="Roboto" pitchFamily="2" charset="0"/>
+                    <a:cs typeface="Arial" panose="020B0604020202020204" pitchFamily="34" charset="0"/>
+                  </a:rPr>
+                  <a:t>This slide is an editable </a:t>
+                </a:r>
+                <a:br>
+                  <a:rPr lang="en-US" sz="1400" dirty="0">
+                    <a:latin typeface="Roboto" pitchFamily="2" charset="0"/>
+                    <a:ea typeface="Roboto" pitchFamily="2" charset="0"/>
+                    <a:cs typeface="Arial" panose="020B0604020202020204" pitchFamily="34" charset="0"/>
+                  </a:rPr>
+                </a:br>
+                <a:r>
+                  <a:rPr lang="en-US" sz="1400" dirty="0">
+                    <a:latin typeface="Roboto" pitchFamily="2" charset="0"/>
+                    <a:ea typeface="Roboto" pitchFamily="2" charset="0"/>
+                    <a:cs typeface="Arial" panose="020B0604020202020204" pitchFamily="34" charset="0"/>
+                  </a:rPr>
+                  <a:t>slide with all your needs. </a:t>
+                </a:r>
+                <a:endParaRPr lang="en-US" sz="1400" dirty="0">
+                  <a:latin typeface="Roboto" pitchFamily="2" charset="0"/>
+                  <a:ea typeface="Roboto" pitchFamily="2" charset="0"/>
+                  <a:cs typeface="Roboto"/>
+                  <a:sym typeface="Roboto"/>
+                </a:endParaRPr>
+              </a:p>
+            </p:txBody>
+          </p:sp>
+          <p:sp>
+            <p:nvSpPr>
+              <p:cNvPr id="41" name="Google Shape;114;p18">
+                <a:extLst>
+                  <a:ext uri="{FF2B5EF4-FFF2-40B4-BE49-F238E27FC236}">
+                    <a16:creationId xmlns:a16="http://schemas.microsoft.com/office/drawing/2014/main" id="{07894F9A-BB1C-0DDB-61DC-BF991856C1D9}"/>
+                  </a:ext>
+                </a:extLst>
+              </p:cNvPr>
+              <p:cNvSpPr txBox="1"/>
+              <p:nvPr/>
+            </p:nvSpPr>
+            <p:spPr>
+              <a:xfrm>
+                <a:off x="415698" y="4018475"/>
+                <a:ext cx="2079600" cy="354600"/>
+              </a:xfrm>
+              <a:prstGeom prst="rect">
+                <a:avLst/>
+              </a:prstGeom>
+              <a:noFill/>
+              <a:ln>
+                <a:noFill/>
+              </a:ln>
+            </p:spPr>
+            <p:txBody>
+              <a:bodyPr spcFirstLastPara="1" wrap="square" lIns="91425" tIns="91425" rIns="91425" bIns="91425" anchor="ctr" anchorCtr="0">
+                <a:noAutofit/>
+              </a:bodyPr>
+              <a:lstStyle/>
+              <a:p>
+                <a:pPr marL="0" lvl="0" indent="0" algn="ctr" rtl="0">
+                  <a:spcBef>
+                    <a:spcPts val="0"/>
+                  </a:spcBef>
+                  <a:spcAft>
+                    <a:spcPts val="0"/>
+                  </a:spcAft>
+                  <a:buNone/>
+                </a:pPr>
+                <a:r>
+                  <a:rPr lang="en-IN" sz="1800" b="1" dirty="0">
+                    <a:solidFill>
+                      <a:schemeClr val="accent2"/>
+                    </a:solidFill>
+                    <a:latin typeface="Fira Sans Extra Condensed Medium"/>
+                    <a:ea typeface="Fira Sans Extra Condensed Medium"/>
+                    <a:cs typeface="Fira Sans Extra Condensed Medium"/>
+                    <a:sym typeface="Fira Sans Extra Condensed Medium"/>
+                  </a:rPr>
+                  <a:t>Your text</a:t>
+                </a:r>
+                <a:endParaRPr sz="1800" b="1" dirty="0">
+                  <a:solidFill>
+                    <a:schemeClr val="accent2"/>
+                  </a:solidFill>
+                  <a:latin typeface="Fira Sans Extra Condensed Medium"/>
+                  <a:ea typeface="Fira Sans Extra Condensed Medium"/>
+                  <a:cs typeface="Fira Sans Extra Condensed Medium"/>
+                  <a:sym typeface="Fira Sans Extra Condensed Medium"/>
+                </a:endParaRPr>
+              </a:p>
+            </p:txBody>
+          </p:sp>
+        </p:grpSp>
+        <p:grpSp>
+          <p:nvGrpSpPr>
+            <p:cNvPr id="5" name="Google Shape;115;p18">
+              <a:extLst>
+                <a:ext uri="{FF2B5EF4-FFF2-40B4-BE49-F238E27FC236}">
+                  <a16:creationId xmlns:a16="http://schemas.microsoft.com/office/drawing/2014/main" id="{2FC5CB01-CC17-8674-35F0-D1DB2035232A}"/>
+                </a:ext>
+              </a:extLst>
+            </p:cNvPr>
+            <p:cNvGrpSpPr/>
+            <p:nvPr/>
+          </p:nvGrpSpPr>
+          <p:grpSpPr>
+            <a:xfrm>
+              <a:off x="3263673" y="4018475"/>
+              <a:ext cx="2079600" cy="839268"/>
+              <a:chOff x="3263673" y="4018475"/>
+              <a:chExt cx="2079600" cy="839268"/>
+            </a:xfrm>
+          </p:grpSpPr>
+          <p:sp>
+            <p:nvSpPr>
+              <p:cNvPr id="38" name="Google Shape;116;p18">
+                <a:extLst>
+                  <a:ext uri="{FF2B5EF4-FFF2-40B4-BE49-F238E27FC236}">
+                    <a16:creationId xmlns:a16="http://schemas.microsoft.com/office/drawing/2014/main" id="{E4A37DBC-6E31-AE74-2ED8-22B860DEB975}"/>
+                  </a:ext>
+                </a:extLst>
+              </p:cNvPr>
+              <p:cNvSpPr txBox="1"/>
+              <p:nvPr/>
+            </p:nvSpPr>
+            <p:spPr>
+              <a:xfrm>
+                <a:off x="3263673" y="4267643"/>
+                <a:ext cx="2079600" cy="590100"/>
+              </a:xfrm>
+              <a:prstGeom prst="rect">
+                <a:avLst/>
+              </a:prstGeom>
+              <a:noFill/>
+              <a:ln>
+                <a:noFill/>
+              </a:ln>
+            </p:spPr>
+            <p:txBody>
+              <a:bodyPr spcFirstLastPara="1" wrap="square" lIns="91425" tIns="91425" rIns="91425" bIns="91425" anchor="ctr" anchorCtr="0">
+                <a:noAutofit/>
+              </a:bodyPr>
+              <a:lstStyle/>
+              <a:p>
+                <a:pPr lvl="0" algn="ctr">
+                  <a:lnSpc>
+                    <a:spcPct val="110000"/>
+                  </a:lnSpc>
+                </a:pPr>
+                <a:r>
+                  <a:rPr lang="en-US" sz="1400" dirty="0">
+                    <a:latin typeface="Roboto" pitchFamily="2" charset="0"/>
+                    <a:ea typeface="Roboto" pitchFamily="2" charset="0"/>
+                    <a:cs typeface="Arial" panose="020B0604020202020204" pitchFamily="34" charset="0"/>
+                  </a:rPr>
+                  <a:t>This slide is an editable </a:t>
+                </a:r>
+                <a:br>
+                  <a:rPr lang="en-US" sz="1400" dirty="0">
+                    <a:latin typeface="Roboto" pitchFamily="2" charset="0"/>
+                    <a:ea typeface="Roboto" pitchFamily="2" charset="0"/>
+                    <a:cs typeface="Arial" panose="020B0604020202020204" pitchFamily="34" charset="0"/>
+                  </a:rPr>
+                </a:br>
+                <a:r>
+                  <a:rPr lang="en-US" sz="1400" dirty="0">
+                    <a:latin typeface="Roboto" pitchFamily="2" charset="0"/>
+                    <a:ea typeface="Roboto" pitchFamily="2" charset="0"/>
+                    <a:cs typeface="Arial" panose="020B0604020202020204" pitchFamily="34" charset="0"/>
+                  </a:rPr>
+                  <a:t>slide with all your needs. </a:t>
+                </a:r>
+                <a:endParaRPr lang="en-US" sz="1400" dirty="0">
+                  <a:latin typeface="Roboto" pitchFamily="2" charset="0"/>
+                  <a:ea typeface="Roboto" pitchFamily="2" charset="0"/>
+                  <a:cs typeface="Roboto"/>
+                  <a:sym typeface="Roboto"/>
+                </a:endParaRPr>
+              </a:p>
+            </p:txBody>
+          </p:sp>
+          <p:sp>
+            <p:nvSpPr>
+              <p:cNvPr id="39" name="Google Shape;117;p18">
+                <a:extLst>
+                  <a:ext uri="{FF2B5EF4-FFF2-40B4-BE49-F238E27FC236}">
+                    <a16:creationId xmlns:a16="http://schemas.microsoft.com/office/drawing/2014/main" id="{89EFB81E-AB9B-1045-E82F-FF02DEDADEFF}"/>
+                  </a:ext>
+                </a:extLst>
+              </p:cNvPr>
+              <p:cNvSpPr txBox="1"/>
+              <p:nvPr/>
+            </p:nvSpPr>
+            <p:spPr>
+              <a:xfrm>
+                <a:off x="3263673" y="4018475"/>
+                <a:ext cx="2079600" cy="354600"/>
+              </a:xfrm>
+              <a:prstGeom prst="rect">
+                <a:avLst/>
+              </a:prstGeom>
+              <a:noFill/>
+              <a:ln>
+                <a:noFill/>
+              </a:ln>
+            </p:spPr>
+            <p:txBody>
+              <a:bodyPr spcFirstLastPara="1" wrap="square" lIns="91425" tIns="91425" rIns="91425" bIns="91425" anchor="ctr" anchorCtr="0">
+                <a:noAutofit/>
+              </a:bodyPr>
+              <a:lstStyle/>
+              <a:p>
+                <a:pPr lvl="0" algn="ctr"/>
+                <a:r>
+                  <a:rPr lang="en-IN" b="1" dirty="0">
+                    <a:solidFill>
+                      <a:schemeClr val="accent6"/>
+                    </a:solidFill>
+                    <a:latin typeface="Fira Sans Extra Condensed Medium"/>
+                    <a:ea typeface="Fira Sans Extra Condensed Medium"/>
+                    <a:cs typeface="Fira Sans Extra Condensed Medium"/>
+                    <a:sym typeface="Fira Sans Extra Condensed Medium"/>
+                  </a:rPr>
+                  <a:t>Your text</a:t>
+                </a:r>
+              </a:p>
+            </p:txBody>
+          </p:sp>
+        </p:grpSp>
+        <p:grpSp>
+          <p:nvGrpSpPr>
+            <p:cNvPr id="6" name="Google Shape;118;p18">
+              <a:extLst>
+                <a:ext uri="{FF2B5EF4-FFF2-40B4-BE49-F238E27FC236}">
+                  <a16:creationId xmlns:a16="http://schemas.microsoft.com/office/drawing/2014/main" id="{1299507E-A996-5FC0-DA5C-A4C84AB7775A}"/>
+                </a:ext>
+              </a:extLst>
+            </p:cNvPr>
+            <p:cNvGrpSpPr/>
+            <p:nvPr/>
+          </p:nvGrpSpPr>
+          <p:grpSpPr>
+            <a:xfrm>
+              <a:off x="6530748" y="2854044"/>
+              <a:ext cx="2079600" cy="839268"/>
+              <a:chOff x="6530748" y="2854044"/>
+              <a:chExt cx="2079600" cy="839268"/>
+            </a:xfrm>
+          </p:grpSpPr>
+          <p:sp>
+            <p:nvSpPr>
+              <p:cNvPr id="36" name="Google Shape;119;p18">
+                <a:extLst>
+                  <a:ext uri="{FF2B5EF4-FFF2-40B4-BE49-F238E27FC236}">
+                    <a16:creationId xmlns:a16="http://schemas.microsoft.com/office/drawing/2014/main" id="{062079F2-C0AC-1293-9985-F4C2AC302DFF}"/>
+                  </a:ext>
+                </a:extLst>
+              </p:cNvPr>
+              <p:cNvSpPr txBox="1"/>
+              <p:nvPr/>
+            </p:nvSpPr>
+            <p:spPr>
+              <a:xfrm>
+                <a:off x="6530748" y="3103212"/>
+                <a:ext cx="2079600" cy="590100"/>
+              </a:xfrm>
+              <a:prstGeom prst="rect">
+                <a:avLst/>
+              </a:prstGeom>
+              <a:noFill/>
+              <a:ln>
+                <a:noFill/>
+              </a:ln>
+            </p:spPr>
+            <p:txBody>
+              <a:bodyPr spcFirstLastPara="1" wrap="square" lIns="91425" tIns="91425" rIns="91425" bIns="91425" anchor="ctr" anchorCtr="0">
+                <a:noAutofit/>
+              </a:bodyPr>
+              <a:lstStyle/>
+              <a:p>
+                <a:pPr lvl="0" algn="ctr">
+                  <a:lnSpc>
+                    <a:spcPct val="110000"/>
+                  </a:lnSpc>
+                </a:pPr>
+                <a:r>
+                  <a:rPr lang="en-US" sz="1400" dirty="0">
+                    <a:latin typeface="Roboto" pitchFamily="2" charset="0"/>
+                    <a:ea typeface="Roboto" pitchFamily="2" charset="0"/>
+                    <a:cs typeface="Arial" panose="020B0604020202020204" pitchFamily="34" charset="0"/>
+                  </a:rPr>
+                  <a:t>This slide is an editable </a:t>
+                </a:r>
+                <a:br>
+                  <a:rPr lang="en-US" sz="1400" dirty="0">
+                    <a:latin typeface="Roboto" pitchFamily="2" charset="0"/>
+                    <a:ea typeface="Roboto" pitchFamily="2" charset="0"/>
+                    <a:cs typeface="Arial" panose="020B0604020202020204" pitchFamily="34" charset="0"/>
+                  </a:rPr>
+                </a:br>
+                <a:r>
+                  <a:rPr lang="en-US" sz="1400" dirty="0">
+                    <a:latin typeface="Roboto" pitchFamily="2" charset="0"/>
+                    <a:ea typeface="Roboto" pitchFamily="2" charset="0"/>
+                    <a:cs typeface="Arial" panose="020B0604020202020204" pitchFamily="34" charset="0"/>
+                  </a:rPr>
+                  <a:t>slide with all your needs. </a:t>
+                </a:r>
+                <a:endParaRPr lang="en-US" sz="1400" dirty="0">
+                  <a:latin typeface="Roboto" pitchFamily="2" charset="0"/>
+                  <a:ea typeface="Roboto" pitchFamily="2" charset="0"/>
+                  <a:cs typeface="Roboto"/>
+                  <a:sym typeface="Roboto"/>
+                </a:endParaRPr>
+              </a:p>
+            </p:txBody>
+          </p:sp>
+          <p:sp>
+            <p:nvSpPr>
+              <p:cNvPr id="37" name="Google Shape;120;p18">
+                <a:extLst>
+                  <a:ext uri="{FF2B5EF4-FFF2-40B4-BE49-F238E27FC236}">
+                    <a16:creationId xmlns:a16="http://schemas.microsoft.com/office/drawing/2014/main" id="{AD605A35-94C5-94B2-2319-A05C85E981DA}"/>
+                  </a:ext>
+                </a:extLst>
+              </p:cNvPr>
+              <p:cNvSpPr txBox="1"/>
+              <p:nvPr/>
+            </p:nvSpPr>
+            <p:spPr>
+              <a:xfrm>
+                <a:off x="6530748" y="2854044"/>
+                <a:ext cx="2079600" cy="354600"/>
+              </a:xfrm>
+              <a:prstGeom prst="rect">
+                <a:avLst/>
+              </a:prstGeom>
+              <a:noFill/>
+              <a:ln>
+                <a:noFill/>
+              </a:ln>
+            </p:spPr>
+            <p:txBody>
+              <a:bodyPr spcFirstLastPara="1" wrap="square" lIns="91425" tIns="91425" rIns="91425" bIns="91425" anchor="ctr" anchorCtr="0">
+                <a:noAutofit/>
+              </a:bodyPr>
+              <a:lstStyle/>
+              <a:p>
+                <a:pPr lvl="0" algn="ctr"/>
+                <a:r>
+                  <a:rPr lang="en-IN" b="1" dirty="0">
+                    <a:solidFill>
+                      <a:schemeClr val="accent1"/>
+                    </a:solidFill>
+                    <a:latin typeface="Fira Sans Extra Condensed Medium"/>
+                    <a:ea typeface="Fira Sans Extra Condensed Medium"/>
+                    <a:cs typeface="Fira Sans Extra Condensed Medium"/>
+                    <a:sym typeface="Fira Sans Extra Condensed Medium"/>
+                  </a:rPr>
+                  <a:t>Your text</a:t>
+                </a:r>
+              </a:p>
+            </p:txBody>
+          </p:sp>
+        </p:grpSp>
+        <p:sp>
+          <p:nvSpPr>
+            <p:cNvPr id="7" name="Google Shape;121;p18">
+              <a:extLst>
+                <a:ext uri="{FF2B5EF4-FFF2-40B4-BE49-F238E27FC236}">
+                  <a16:creationId xmlns:a16="http://schemas.microsoft.com/office/drawing/2014/main" id="{56A62373-0852-729C-BD92-84E95E278E63}"/>
+                </a:ext>
+              </a:extLst>
+            </p:cNvPr>
+            <p:cNvSpPr txBox="1"/>
+            <p:nvPr/>
+          </p:nvSpPr>
+          <p:spPr>
+            <a:xfrm>
+              <a:off x="3879750" y="2535689"/>
+              <a:ext cx="944100" cy="536400"/>
+            </a:xfrm>
+            <a:prstGeom prst="rect">
+              <a:avLst/>
+            </a:prstGeom>
+            <a:noFill/>
+            <a:ln>
+              <a:noFill/>
+            </a:ln>
+          </p:spPr>
+          <p:txBody>
+            <a:bodyPr spcFirstLastPara="1" wrap="square" lIns="91425" tIns="91425" rIns="91425" bIns="91425" anchor="ctr" anchorCtr="0">
+              <a:noAutofit/>
+            </a:bodyPr>
+            <a:lstStyle/>
+            <a:p>
+              <a:pPr marL="0" lvl="0" indent="0" algn="ctr" rtl="0">
+                <a:spcBef>
+                  <a:spcPts val="0"/>
+                </a:spcBef>
+                <a:spcAft>
+                  <a:spcPts val="0"/>
+                </a:spcAft>
+                <a:buNone/>
+              </a:pPr>
+              <a:r>
+                <a:rPr lang="en" sz="1800">
+                  <a:solidFill>
+                    <a:schemeClr val="dk1"/>
+                  </a:solidFill>
+                  <a:latin typeface="Fira Sans Extra Condensed Medium"/>
+                  <a:ea typeface="Fira Sans Extra Condensed Medium"/>
+                  <a:cs typeface="Fira Sans Extra Condensed Medium"/>
+                  <a:sym typeface="Fira Sans Extra Condensed Medium"/>
+                </a:rPr>
+                <a:t>SCRUM</a:t>
+              </a:r>
+              <a:endParaRPr sz="1800">
+                <a:solidFill>
+                  <a:schemeClr val="dk1"/>
+                </a:solidFill>
+                <a:latin typeface="Fira Sans Extra Condensed Medium"/>
+                <a:ea typeface="Fira Sans Extra Condensed Medium"/>
+                <a:cs typeface="Fira Sans Extra Condensed Medium"/>
+                <a:sym typeface="Fira Sans Extra Condensed Medium"/>
+              </a:endParaRPr>
+            </a:p>
+          </p:txBody>
+        </p:sp>
+        <p:sp>
+          <p:nvSpPr>
+            <p:cNvPr id="8" name="Google Shape;122;p18">
+              <a:extLst>
+                <a:ext uri="{FF2B5EF4-FFF2-40B4-BE49-F238E27FC236}">
+                  <a16:creationId xmlns:a16="http://schemas.microsoft.com/office/drawing/2014/main" id="{CC90267F-B0B5-CCD4-589A-35AD263E7093}"/>
+                </a:ext>
+              </a:extLst>
+            </p:cNvPr>
+            <p:cNvSpPr txBox="1"/>
+            <p:nvPr/>
+          </p:nvSpPr>
+          <p:spPr>
+            <a:xfrm>
+              <a:off x="5231791" y="1634410"/>
+              <a:ext cx="944100" cy="536400"/>
+            </a:xfrm>
+            <a:prstGeom prst="rect">
+              <a:avLst/>
+            </a:prstGeom>
+            <a:noFill/>
+            <a:ln>
+              <a:noFill/>
+            </a:ln>
+          </p:spPr>
+          <p:txBody>
+            <a:bodyPr spcFirstLastPara="1" wrap="square" lIns="91425" tIns="91425" rIns="91425" bIns="91425" anchor="ctr" anchorCtr="0">
+              <a:noAutofit/>
+            </a:bodyPr>
+            <a:lstStyle/>
+            <a:p>
+              <a:pPr marL="0" lvl="0" indent="0" algn="ctr" rtl="0">
+                <a:spcBef>
+                  <a:spcPts val="0"/>
+                </a:spcBef>
+                <a:spcAft>
+                  <a:spcPts val="0"/>
+                </a:spcAft>
+                <a:buNone/>
+              </a:pPr>
+              <a:r>
+                <a:rPr lang="en" sz="1800" dirty="0">
+                  <a:solidFill>
+                    <a:schemeClr val="dk1"/>
+                  </a:solidFill>
+                  <a:latin typeface="Fira Sans Extra Condensed Medium"/>
+                  <a:ea typeface="Fira Sans Extra Condensed Medium"/>
+                  <a:cs typeface="Fira Sans Extra Condensed Medium"/>
+                  <a:sym typeface="Fira Sans Extra Condensed Medium"/>
+                </a:rPr>
+                <a:t>Daily SCRUM</a:t>
+              </a:r>
+              <a:endParaRPr sz="2100" dirty="0">
+                <a:solidFill>
+                  <a:schemeClr val="dk1"/>
+                </a:solidFill>
+                <a:latin typeface="Fira Sans Extra Condensed Medium"/>
+                <a:ea typeface="Fira Sans Extra Condensed Medium"/>
+                <a:cs typeface="Fira Sans Extra Condensed Medium"/>
+                <a:sym typeface="Fira Sans Extra Condensed Medium"/>
+              </a:endParaRPr>
+            </a:p>
+          </p:txBody>
+        </p:sp>
+        <p:grpSp>
+          <p:nvGrpSpPr>
+            <p:cNvPr id="9" name="Google Shape;123;p18">
+              <a:extLst>
+                <a:ext uri="{FF2B5EF4-FFF2-40B4-BE49-F238E27FC236}">
+                  <a16:creationId xmlns:a16="http://schemas.microsoft.com/office/drawing/2014/main" id="{714FC707-91DC-C209-0781-B2B1087F44B6}"/>
+                </a:ext>
+              </a:extLst>
+            </p:cNvPr>
+            <p:cNvGrpSpPr/>
+            <p:nvPr/>
+          </p:nvGrpSpPr>
+          <p:grpSpPr>
+            <a:xfrm>
+              <a:off x="1200649" y="899809"/>
+              <a:ext cx="6624749" cy="3232159"/>
+              <a:chOff x="1200649" y="899809"/>
+              <a:chExt cx="6624749" cy="3232159"/>
+            </a:xfrm>
+          </p:grpSpPr>
+          <p:grpSp>
+            <p:nvGrpSpPr>
+              <p:cNvPr id="10" name="Google Shape;124;p18">
+                <a:extLst>
+                  <a:ext uri="{FF2B5EF4-FFF2-40B4-BE49-F238E27FC236}">
+                    <a16:creationId xmlns:a16="http://schemas.microsoft.com/office/drawing/2014/main" id="{40EAA6FD-E476-AD4C-2989-70476D9015F7}"/>
+                  </a:ext>
+                </a:extLst>
+              </p:cNvPr>
+              <p:cNvGrpSpPr/>
+              <p:nvPr/>
+            </p:nvGrpSpPr>
+            <p:grpSpPr>
+              <a:xfrm>
+                <a:off x="1200649" y="899809"/>
+                <a:ext cx="6624749" cy="3232159"/>
+                <a:chOff x="1200649" y="899809"/>
+                <a:chExt cx="6624749" cy="3232159"/>
+              </a:xfrm>
+            </p:grpSpPr>
+            <p:sp>
+              <p:nvSpPr>
+                <p:cNvPr id="16" name="Google Shape;125;p18">
+                  <a:extLst>
+                    <a:ext uri="{FF2B5EF4-FFF2-40B4-BE49-F238E27FC236}">
+                      <a16:creationId xmlns:a16="http://schemas.microsoft.com/office/drawing/2014/main" id="{61EF082E-DBE2-687F-6E71-C329D2F1A4FA}"/>
+                    </a:ext>
+                  </a:extLst>
+                </p:cNvPr>
+                <p:cNvSpPr/>
+                <p:nvPr/>
+              </p:nvSpPr>
+              <p:spPr>
+                <a:xfrm rot="-214878">
+                  <a:off x="5255128" y="3293341"/>
+                  <a:ext cx="1475592" cy="793315"/>
+                </a:xfrm>
+                <a:custGeom>
+                  <a:avLst/>
+                  <a:gdLst/>
+                  <a:ahLst/>
+                  <a:cxnLst/>
+                  <a:rect l="l" t="t" r="r" b="b"/>
+                  <a:pathLst>
+                    <a:path w="16093" h="8652" extrusionOk="0">
+                      <a:moveTo>
+                        <a:pt x="2489" y="1"/>
+                      </a:moveTo>
+                      <a:lnTo>
+                        <a:pt x="1" y="2763"/>
+                      </a:lnTo>
+                      <a:cubicBezTo>
+                        <a:pt x="2101" y="5981"/>
+                        <a:pt x="5707" y="8172"/>
+                        <a:pt x="9907" y="8264"/>
+                      </a:cubicBezTo>
+                      <a:cubicBezTo>
+                        <a:pt x="11619" y="8264"/>
+                        <a:pt x="13331" y="7898"/>
+                        <a:pt x="14746" y="7328"/>
+                      </a:cubicBezTo>
+                      <a:lnTo>
+                        <a:pt x="16093" y="8652"/>
+                      </a:lnTo>
+                      <a:lnTo>
+                        <a:pt x="15705" y="3699"/>
+                      </a:lnTo>
+                      <a:lnTo>
+                        <a:pt x="10752" y="3128"/>
+                      </a:lnTo>
+                      <a:lnTo>
+                        <a:pt x="11984" y="4475"/>
+                      </a:lnTo>
+                      <a:cubicBezTo>
+                        <a:pt x="11414" y="4657"/>
+                        <a:pt x="10660" y="4657"/>
+                        <a:pt x="9998" y="4657"/>
+                      </a:cubicBezTo>
+                      <a:cubicBezTo>
+                        <a:pt x="6666" y="4657"/>
+                        <a:pt x="3904" y="2763"/>
+                        <a:pt x="2489" y="1"/>
+                      </a:cubicBezTo>
+                      <a:close/>
+                    </a:path>
+                  </a:pathLst>
+                </a:custGeom>
+                <a:solidFill>
+                  <a:schemeClr val="accent6"/>
+                </a:solidFill>
+                <a:ln>
+                  <a:noFill/>
+                </a:ln>
+              </p:spPr>
+              <p:txBody>
+                <a:bodyPr spcFirstLastPara="1" wrap="square" lIns="91425" tIns="91425" rIns="91425" bIns="91425" anchor="ctr" anchorCtr="0">
+                  <a:noAutofit/>
+                </a:bodyPr>
+                <a:lstStyle/>
+                <a:p>
+                  <a:pPr marL="0" lvl="0" indent="0" algn="l" rtl="0">
+                    <a:spcBef>
+                      <a:spcPts val="0"/>
+                    </a:spcBef>
+                    <a:spcAft>
+                      <a:spcPts val="0"/>
+                    </a:spcAft>
+                    <a:buNone/>
+                  </a:pPr>
+                  <a:endParaRPr dirty="0"/>
+                </a:p>
+              </p:txBody>
+            </p:sp>
+            <p:sp>
+              <p:nvSpPr>
+                <p:cNvPr id="17" name="Google Shape;126;p18">
+                  <a:extLst>
+                    <a:ext uri="{FF2B5EF4-FFF2-40B4-BE49-F238E27FC236}">
+                      <a16:creationId xmlns:a16="http://schemas.microsoft.com/office/drawing/2014/main" id="{DA54E102-EC15-0D0B-948E-70F84AFC3C1E}"/>
+                    </a:ext>
+                  </a:extLst>
+                </p:cNvPr>
+                <p:cNvSpPr/>
+                <p:nvPr/>
+              </p:nvSpPr>
+              <p:spPr>
+                <a:xfrm rot="203186">
+                  <a:off x="4581344" y="963306"/>
+                  <a:ext cx="2212923" cy="2132103"/>
+                </a:xfrm>
+                <a:custGeom>
+                  <a:avLst/>
+                  <a:gdLst/>
+                  <a:ahLst/>
+                  <a:cxnLst/>
+                  <a:rect l="l" t="t" r="r" b="b"/>
+                  <a:pathLst>
+                    <a:path w="25382" h="24455" extrusionOk="0">
+                      <a:moveTo>
+                        <a:pt x="11769" y="0"/>
+                      </a:moveTo>
+                      <a:cubicBezTo>
+                        <a:pt x="8065" y="0"/>
+                        <a:pt x="4410" y="1714"/>
+                        <a:pt x="2077" y="4962"/>
+                      </a:cubicBezTo>
+                      <a:cubicBezTo>
+                        <a:pt x="1027" y="6285"/>
+                        <a:pt x="365" y="7906"/>
+                        <a:pt x="0" y="9412"/>
+                      </a:cubicBezTo>
+                      <a:cubicBezTo>
+                        <a:pt x="1415" y="9412"/>
+                        <a:pt x="2556" y="9618"/>
+                        <a:pt x="3515" y="9983"/>
+                      </a:cubicBezTo>
+                      <a:cubicBezTo>
+                        <a:pt x="3789" y="8956"/>
+                        <a:pt x="4177" y="7906"/>
+                        <a:pt x="4839" y="7039"/>
+                      </a:cubicBezTo>
+                      <a:cubicBezTo>
+                        <a:pt x="6544" y="4774"/>
+                        <a:pt x="9130" y="3586"/>
+                        <a:pt x="11749" y="3586"/>
+                      </a:cubicBezTo>
+                      <a:cubicBezTo>
+                        <a:pt x="13511" y="3586"/>
+                        <a:pt x="15289" y="4124"/>
+                        <a:pt x="16822" y="5235"/>
+                      </a:cubicBezTo>
+                      <a:cubicBezTo>
+                        <a:pt x="20634" y="7997"/>
+                        <a:pt x="21387" y="13407"/>
+                        <a:pt x="18626" y="17127"/>
+                      </a:cubicBezTo>
+                      <a:cubicBezTo>
+                        <a:pt x="18260" y="17698"/>
+                        <a:pt x="17781" y="18269"/>
+                        <a:pt x="17210" y="18657"/>
+                      </a:cubicBezTo>
+                      <a:lnTo>
+                        <a:pt x="16914" y="16739"/>
+                      </a:lnTo>
+                      <a:lnTo>
+                        <a:pt x="14448" y="21122"/>
+                      </a:lnTo>
+                      <a:lnTo>
+                        <a:pt x="18055" y="24454"/>
+                      </a:lnTo>
+                      <a:lnTo>
+                        <a:pt x="18055" y="24454"/>
+                      </a:lnTo>
+                      <a:lnTo>
+                        <a:pt x="17781" y="22537"/>
+                      </a:lnTo>
+                      <a:cubicBezTo>
+                        <a:pt x="19196" y="21784"/>
+                        <a:pt x="20429" y="20643"/>
+                        <a:pt x="21479" y="19319"/>
+                      </a:cubicBezTo>
+                      <a:cubicBezTo>
+                        <a:pt x="25382" y="13886"/>
+                        <a:pt x="24241" y="6377"/>
+                        <a:pt x="18922" y="2382"/>
+                      </a:cubicBezTo>
+                      <a:cubicBezTo>
+                        <a:pt x="16774" y="776"/>
+                        <a:pt x="14260" y="0"/>
+                        <a:pt x="11769" y="0"/>
+                      </a:cubicBezTo>
+                      <a:close/>
+                    </a:path>
+                  </a:pathLst>
+                </a:custGeom>
+                <a:solidFill>
+                  <a:schemeClr val="accent1"/>
+                </a:solidFill>
+                <a:ln>
+                  <a:noFill/>
+                </a:ln>
+              </p:spPr>
+              <p:txBody>
+                <a:bodyPr spcFirstLastPara="1" wrap="square" lIns="91425" tIns="91425" rIns="91425" bIns="91425" anchor="ctr" anchorCtr="0">
+                  <a:noAutofit/>
+                </a:bodyPr>
+                <a:lstStyle/>
+                <a:p>
+                  <a:pPr marL="0" lvl="0" indent="0" algn="l" rtl="0">
+                    <a:spcBef>
+                      <a:spcPts val="0"/>
+                    </a:spcBef>
+                    <a:spcAft>
+                      <a:spcPts val="0"/>
+                    </a:spcAft>
+                    <a:buNone/>
+                  </a:pPr>
+                  <a:endParaRPr/>
+                </a:p>
+              </p:txBody>
+            </p:sp>
+            <p:sp>
+              <p:nvSpPr>
+                <p:cNvPr id="18" name="Google Shape;127;p18">
+                  <a:extLst>
+                    <a:ext uri="{FF2B5EF4-FFF2-40B4-BE49-F238E27FC236}">
+                      <a16:creationId xmlns:a16="http://schemas.microsoft.com/office/drawing/2014/main" id="{ECEF7B1A-BAA6-0EF6-E188-F04EC04CB157}"/>
+                    </a:ext>
+                  </a:extLst>
+                </p:cNvPr>
+                <p:cNvSpPr/>
+                <p:nvPr/>
+              </p:nvSpPr>
+              <p:spPr>
+                <a:xfrm>
+                  <a:off x="1589775" y="3544875"/>
+                  <a:ext cx="2804806" cy="295124"/>
+                </a:xfrm>
+                <a:custGeom>
+                  <a:avLst/>
+                  <a:gdLst/>
+                  <a:ahLst/>
+                  <a:cxnLst/>
+                  <a:rect l="l" t="t" r="r" b="b"/>
+                  <a:pathLst>
+                    <a:path w="26433" h="3516" extrusionOk="0">
+                      <a:moveTo>
+                        <a:pt x="1" y="1"/>
+                      </a:moveTo>
+                      <a:lnTo>
+                        <a:pt x="1" y="3516"/>
+                      </a:lnTo>
+                      <a:lnTo>
+                        <a:pt x="26432" y="3516"/>
+                      </a:lnTo>
+                      <a:lnTo>
+                        <a:pt x="26432" y="1"/>
+                      </a:lnTo>
+                      <a:close/>
+                    </a:path>
+                  </a:pathLst>
+                </a:custGeom>
+                <a:solidFill>
+                  <a:schemeClr val="accent2"/>
+                </a:solidFill>
+                <a:ln>
+                  <a:noFill/>
+                </a:ln>
+              </p:spPr>
+              <p:txBody>
+                <a:bodyPr spcFirstLastPara="1" wrap="square" lIns="91425" tIns="91425" rIns="91425" bIns="91425" anchor="ctr" anchorCtr="0">
+                  <a:noAutofit/>
+                </a:bodyPr>
+                <a:lstStyle/>
+                <a:p>
+                  <a:pPr marL="0" lvl="0" indent="0" algn="l" rtl="0">
+                    <a:spcBef>
+                      <a:spcPts val="0"/>
+                    </a:spcBef>
+                    <a:spcAft>
+                      <a:spcPts val="0"/>
+                    </a:spcAft>
+                    <a:buNone/>
+                  </a:pPr>
+                  <a:endParaRPr/>
+                </a:p>
+              </p:txBody>
+            </p:sp>
+            <p:sp>
+              <p:nvSpPr>
+                <p:cNvPr id="19" name="Google Shape;128;p18">
+                  <a:extLst>
+                    <a:ext uri="{FF2B5EF4-FFF2-40B4-BE49-F238E27FC236}">
+                      <a16:creationId xmlns:a16="http://schemas.microsoft.com/office/drawing/2014/main" id="{2001CE22-AFD1-C2BE-D3FE-472712711714}"/>
+                    </a:ext>
+                  </a:extLst>
+                </p:cNvPr>
+                <p:cNvSpPr/>
+                <p:nvPr/>
+              </p:nvSpPr>
+              <p:spPr>
+                <a:xfrm>
+                  <a:off x="3308116" y="1812837"/>
+                  <a:ext cx="2059781" cy="2027211"/>
+                </a:xfrm>
+                <a:custGeom>
+                  <a:avLst/>
+                  <a:gdLst/>
+                  <a:ahLst/>
+                  <a:cxnLst/>
+                  <a:rect l="l" t="t" r="r" b="b"/>
+                  <a:pathLst>
+                    <a:path w="24538" h="24150" extrusionOk="0">
+                      <a:moveTo>
+                        <a:pt x="12463" y="1"/>
+                      </a:moveTo>
+                      <a:cubicBezTo>
+                        <a:pt x="5821" y="1"/>
+                        <a:pt x="388" y="5410"/>
+                        <a:pt x="388" y="12075"/>
+                      </a:cubicBezTo>
+                      <a:cubicBezTo>
+                        <a:pt x="388" y="13787"/>
+                        <a:pt x="776" y="15408"/>
+                        <a:pt x="1347" y="16914"/>
+                      </a:cubicBezTo>
+                      <a:lnTo>
+                        <a:pt x="0" y="18261"/>
+                      </a:lnTo>
+                      <a:lnTo>
+                        <a:pt x="4953" y="17782"/>
+                      </a:lnTo>
+                      <a:lnTo>
+                        <a:pt x="5524" y="12829"/>
+                      </a:lnTo>
+                      <a:lnTo>
+                        <a:pt x="5524" y="12829"/>
+                      </a:lnTo>
+                      <a:lnTo>
+                        <a:pt x="4200" y="14152"/>
+                      </a:lnTo>
+                      <a:cubicBezTo>
+                        <a:pt x="3995" y="13490"/>
+                        <a:pt x="3904" y="12829"/>
+                        <a:pt x="3904" y="12075"/>
+                      </a:cubicBezTo>
+                      <a:cubicBezTo>
+                        <a:pt x="3904" y="7419"/>
+                        <a:pt x="7715" y="3607"/>
+                        <a:pt x="12463" y="3607"/>
+                      </a:cubicBezTo>
+                      <a:cubicBezTo>
+                        <a:pt x="17119" y="3607"/>
+                        <a:pt x="20931" y="7419"/>
+                        <a:pt x="20931" y="12075"/>
+                      </a:cubicBezTo>
+                      <a:cubicBezTo>
+                        <a:pt x="20931" y="16732"/>
+                        <a:pt x="17325" y="20429"/>
+                        <a:pt x="12760" y="20635"/>
+                      </a:cubicBezTo>
+                      <a:lnTo>
+                        <a:pt x="12760" y="24150"/>
+                      </a:lnTo>
+                      <a:cubicBezTo>
+                        <a:pt x="19311" y="23967"/>
+                        <a:pt x="24538" y="18626"/>
+                        <a:pt x="24538" y="12075"/>
+                      </a:cubicBezTo>
+                      <a:cubicBezTo>
+                        <a:pt x="24538" y="5410"/>
+                        <a:pt x="19128" y="1"/>
+                        <a:pt x="12463" y="1"/>
+                      </a:cubicBezTo>
+                      <a:close/>
+                    </a:path>
+                  </a:pathLst>
+                </a:custGeom>
+                <a:solidFill>
+                  <a:schemeClr val="accent2"/>
+                </a:solidFill>
+                <a:ln>
+                  <a:noFill/>
+                </a:ln>
+              </p:spPr>
+              <p:txBody>
+                <a:bodyPr spcFirstLastPara="1" wrap="square" lIns="91425" tIns="91425" rIns="91425" bIns="91425" anchor="ctr" anchorCtr="0">
+                  <a:noAutofit/>
+                </a:bodyPr>
+                <a:lstStyle/>
+                <a:p>
+                  <a:pPr marL="0" lvl="0" indent="0" algn="l" rtl="0">
+                    <a:spcBef>
+                      <a:spcPts val="0"/>
+                    </a:spcBef>
+                    <a:spcAft>
+                      <a:spcPts val="0"/>
+                    </a:spcAft>
+                    <a:buNone/>
+                  </a:pPr>
+                  <a:endParaRPr/>
+                </a:p>
+              </p:txBody>
+            </p:sp>
+            <p:grpSp>
+              <p:nvGrpSpPr>
+                <p:cNvPr id="20" name="Google Shape;129;p18">
+                  <a:extLst>
+                    <a:ext uri="{FF2B5EF4-FFF2-40B4-BE49-F238E27FC236}">
+                      <a16:creationId xmlns:a16="http://schemas.microsoft.com/office/drawing/2014/main" id="{0F8BEDCF-4B3F-88F5-1302-2C7781A5726C}"/>
+                    </a:ext>
+                  </a:extLst>
+                </p:cNvPr>
+                <p:cNvGrpSpPr/>
+                <p:nvPr/>
+              </p:nvGrpSpPr>
+              <p:grpSpPr>
+                <a:xfrm>
+                  <a:off x="1200649" y="3426859"/>
+                  <a:ext cx="509699" cy="509783"/>
+                  <a:chOff x="1200649" y="3426859"/>
+                  <a:chExt cx="509699" cy="509783"/>
+                </a:xfrm>
+              </p:grpSpPr>
+              <p:sp>
+                <p:nvSpPr>
+                  <p:cNvPr id="32" name="Google Shape;130;p18">
+                    <a:extLst>
+                      <a:ext uri="{FF2B5EF4-FFF2-40B4-BE49-F238E27FC236}">
+                        <a16:creationId xmlns:a16="http://schemas.microsoft.com/office/drawing/2014/main" id="{2EB881FE-B800-48C0-E9D0-85A84DF195ED}"/>
+                      </a:ext>
+                    </a:extLst>
+                  </p:cNvPr>
+                  <p:cNvSpPr/>
+                  <p:nvPr/>
+                </p:nvSpPr>
+                <p:spPr>
+                  <a:xfrm>
+                    <a:off x="1200649" y="3426859"/>
+                    <a:ext cx="509699" cy="509783"/>
+                  </a:xfrm>
+                  <a:custGeom>
+                    <a:avLst/>
+                    <a:gdLst/>
+                    <a:ahLst/>
+                    <a:cxnLst/>
+                    <a:rect l="l" t="t" r="r" b="b"/>
+                    <a:pathLst>
+                      <a:path w="6072" h="6073" extrusionOk="0">
+                        <a:moveTo>
+                          <a:pt x="3036" y="1"/>
+                        </a:moveTo>
+                        <a:cubicBezTo>
+                          <a:pt x="1324" y="1"/>
+                          <a:pt x="0" y="1324"/>
+                          <a:pt x="0" y="3036"/>
+                        </a:cubicBezTo>
+                        <a:cubicBezTo>
+                          <a:pt x="0" y="4748"/>
+                          <a:pt x="1324" y="6072"/>
+                          <a:pt x="3036" y="6072"/>
+                        </a:cubicBezTo>
+                        <a:cubicBezTo>
+                          <a:pt x="4748" y="6072"/>
+                          <a:pt x="6072" y="4748"/>
+                          <a:pt x="6072" y="3036"/>
+                        </a:cubicBezTo>
+                        <a:cubicBezTo>
+                          <a:pt x="6072" y="1324"/>
+                          <a:pt x="4748" y="1"/>
+                          <a:pt x="3036" y="1"/>
+                        </a:cubicBezTo>
+                        <a:close/>
+                      </a:path>
+                    </a:pathLst>
+                  </a:custGeom>
+                  <a:solidFill>
+                    <a:schemeClr val="accent2">
+                      <a:lumMod val="75000"/>
+                    </a:schemeClr>
+                  </a:solidFill>
+                  <a:ln>
+                    <a:noFill/>
+                  </a:ln>
+                </p:spPr>
+                <p:txBody>
+                  <a:bodyPr spcFirstLastPara="1" wrap="square" lIns="91425" tIns="91425" rIns="91425" bIns="91425" anchor="ctr" anchorCtr="0">
+                    <a:noAutofit/>
+                  </a:bodyPr>
+                  <a:lstStyle/>
+                  <a:p>
+                    <a:pPr marL="0" lvl="0" indent="0" algn="l" rtl="0">
+                      <a:spcBef>
+                        <a:spcPts val="0"/>
+                      </a:spcBef>
+                      <a:spcAft>
+                        <a:spcPts val="0"/>
+                      </a:spcAft>
+                      <a:buNone/>
+                    </a:pPr>
+                    <a:endParaRPr/>
+                  </a:p>
+                </p:txBody>
+              </p:sp>
+              <p:grpSp>
+                <p:nvGrpSpPr>
+                  <p:cNvPr id="33" name="Google Shape;131;p18">
+                    <a:extLst>
+                      <a:ext uri="{FF2B5EF4-FFF2-40B4-BE49-F238E27FC236}">
+                        <a16:creationId xmlns:a16="http://schemas.microsoft.com/office/drawing/2014/main" id="{B88105C5-89A2-A915-3C04-2F6B9EA54690}"/>
+                      </a:ext>
+                    </a:extLst>
+                  </p:cNvPr>
+                  <p:cNvGrpSpPr/>
+                  <p:nvPr/>
+                </p:nvGrpSpPr>
+                <p:grpSpPr>
+                  <a:xfrm>
+                    <a:off x="1279841" y="3507022"/>
+                    <a:ext cx="351315" cy="349457"/>
+                    <a:chOff x="1412450" y="1954475"/>
+                    <a:chExt cx="297750" cy="296175"/>
+                  </a:xfrm>
+                </p:grpSpPr>
+                <p:sp>
+                  <p:nvSpPr>
+                    <p:cNvPr id="34" name="Google Shape;132;p18">
+                      <a:extLst>
+                        <a:ext uri="{FF2B5EF4-FFF2-40B4-BE49-F238E27FC236}">
+                          <a16:creationId xmlns:a16="http://schemas.microsoft.com/office/drawing/2014/main" id="{FA3BD287-E714-9BB8-F516-23CB6ED329AF}"/>
+                        </a:ext>
+                      </a:extLst>
+                    </p:cNvPr>
+                    <p:cNvSpPr/>
+                    <p:nvPr/>
+                  </p:nvSpPr>
+                  <p:spPr>
+                    <a:xfrm>
+                      <a:off x="1483350" y="2023800"/>
+                      <a:ext cx="155975" cy="155975"/>
+                    </a:xfrm>
+                    <a:custGeom>
+                      <a:avLst/>
+                      <a:gdLst/>
+                      <a:ahLst/>
+                      <a:cxnLst/>
+                      <a:rect l="l" t="t" r="r" b="b"/>
+                      <a:pathLst>
+                        <a:path w="6239" h="6239" extrusionOk="0">
+                          <a:moveTo>
+                            <a:pt x="3119" y="2079"/>
+                          </a:moveTo>
+                          <a:cubicBezTo>
+                            <a:pt x="3529" y="2079"/>
+                            <a:pt x="3844" y="2395"/>
+                            <a:pt x="3844" y="2773"/>
+                          </a:cubicBezTo>
+                          <a:cubicBezTo>
+                            <a:pt x="3844" y="3182"/>
+                            <a:pt x="3529" y="3497"/>
+                            <a:pt x="3119" y="3497"/>
+                          </a:cubicBezTo>
+                          <a:cubicBezTo>
+                            <a:pt x="2741" y="3497"/>
+                            <a:pt x="2426" y="3182"/>
+                            <a:pt x="2426" y="2773"/>
+                          </a:cubicBezTo>
+                          <a:cubicBezTo>
+                            <a:pt x="2426" y="2395"/>
+                            <a:pt x="2741" y="2079"/>
+                            <a:pt x="3119" y="2079"/>
+                          </a:cubicBezTo>
+                          <a:close/>
+                          <a:moveTo>
+                            <a:pt x="3119" y="725"/>
+                          </a:moveTo>
+                          <a:cubicBezTo>
+                            <a:pt x="4474" y="725"/>
+                            <a:pt x="5577" y="1827"/>
+                            <a:pt x="5577" y="3182"/>
+                          </a:cubicBezTo>
+                          <a:cubicBezTo>
+                            <a:pt x="5577" y="3686"/>
+                            <a:pt x="5388" y="4159"/>
+                            <a:pt x="5136" y="4537"/>
+                          </a:cubicBezTo>
+                          <a:cubicBezTo>
+                            <a:pt x="4884" y="4190"/>
+                            <a:pt x="4537" y="3907"/>
+                            <a:pt x="4191" y="3718"/>
+                          </a:cubicBezTo>
+                          <a:cubicBezTo>
+                            <a:pt x="4411" y="3497"/>
+                            <a:pt x="4537" y="3182"/>
+                            <a:pt x="4537" y="2804"/>
+                          </a:cubicBezTo>
+                          <a:cubicBezTo>
+                            <a:pt x="4537" y="2079"/>
+                            <a:pt x="3907" y="1449"/>
+                            <a:pt x="3151" y="1449"/>
+                          </a:cubicBezTo>
+                          <a:cubicBezTo>
+                            <a:pt x="2426" y="1449"/>
+                            <a:pt x="1796" y="2079"/>
+                            <a:pt x="1796" y="2804"/>
+                          </a:cubicBezTo>
+                          <a:cubicBezTo>
+                            <a:pt x="1796" y="3182"/>
+                            <a:pt x="1891" y="3497"/>
+                            <a:pt x="2143" y="3718"/>
+                          </a:cubicBezTo>
+                          <a:cubicBezTo>
+                            <a:pt x="1733" y="3907"/>
+                            <a:pt x="1418" y="4190"/>
+                            <a:pt x="1198" y="4537"/>
+                          </a:cubicBezTo>
+                          <a:cubicBezTo>
+                            <a:pt x="914" y="4159"/>
+                            <a:pt x="756" y="3686"/>
+                            <a:pt x="756" y="3182"/>
+                          </a:cubicBezTo>
+                          <a:cubicBezTo>
+                            <a:pt x="662" y="1796"/>
+                            <a:pt x="1796" y="725"/>
+                            <a:pt x="3119" y="725"/>
+                          </a:cubicBezTo>
+                          <a:close/>
+                          <a:moveTo>
+                            <a:pt x="3119" y="4190"/>
+                          </a:moveTo>
+                          <a:cubicBezTo>
+                            <a:pt x="3749" y="4190"/>
+                            <a:pt x="4317" y="4505"/>
+                            <a:pt x="4632" y="5041"/>
+                          </a:cubicBezTo>
+                          <a:cubicBezTo>
+                            <a:pt x="4222" y="5387"/>
+                            <a:pt x="3686" y="5577"/>
+                            <a:pt x="3119" y="5577"/>
+                          </a:cubicBezTo>
+                          <a:cubicBezTo>
+                            <a:pt x="2584" y="5577"/>
+                            <a:pt x="2017" y="5387"/>
+                            <a:pt x="1639" y="5041"/>
+                          </a:cubicBezTo>
+                          <a:cubicBezTo>
+                            <a:pt x="1954" y="4505"/>
+                            <a:pt x="2489" y="4190"/>
+                            <a:pt x="3119" y="4190"/>
+                          </a:cubicBezTo>
+                          <a:close/>
+                          <a:moveTo>
+                            <a:pt x="3119" y="0"/>
+                          </a:moveTo>
+                          <a:cubicBezTo>
+                            <a:pt x="1387" y="0"/>
+                            <a:pt x="0" y="1418"/>
+                            <a:pt x="0" y="3119"/>
+                          </a:cubicBezTo>
+                          <a:cubicBezTo>
+                            <a:pt x="0" y="4852"/>
+                            <a:pt x="1387" y="6238"/>
+                            <a:pt x="3119" y="6238"/>
+                          </a:cubicBezTo>
+                          <a:cubicBezTo>
+                            <a:pt x="4852" y="6238"/>
+                            <a:pt x="6238" y="4820"/>
+                            <a:pt x="6238" y="3119"/>
+                          </a:cubicBezTo>
+                          <a:cubicBezTo>
+                            <a:pt x="6238" y="1386"/>
+                            <a:pt x="4821" y="0"/>
+                            <a:pt x="3119" y="0"/>
+                          </a:cubicBezTo>
+                          <a:close/>
+                        </a:path>
+                      </a:pathLst>
+                    </a:custGeom>
+                    <a:solidFill>
+                      <a:schemeClr val="lt1"/>
+                    </a:solidFill>
+                    <a:ln>
+                      <a:noFill/>
+                    </a:ln>
+                  </p:spPr>
+                  <p:txBody>
+                    <a:bodyPr spcFirstLastPara="1" wrap="square" lIns="91425" tIns="91425" rIns="91425" bIns="91425" anchor="ctr" anchorCtr="0">
+                      <a:noAutofit/>
+                    </a:bodyPr>
+                    <a:lstStyle/>
+                    <a:p>
+                      <a:pPr marL="0" lvl="0" indent="0" algn="l" rtl="0">
+                        <a:spcBef>
+                          <a:spcPts val="0"/>
+                        </a:spcBef>
+                        <a:spcAft>
+                          <a:spcPts val="0"/>
+                        </a:spcAft>
+                        <a:buNone/>
+                      </a:pPr>
+                      <a:endParaRPr/>
+                    </a:p>
+                  </p:txBody>
+                </p:sp>
+                <p:sp>
+                  <p:nvSpPr>
+                    <p:cNvPr id="35" name="Google Shape;133;p18">
+                      <a:extLst>
+                        <a:ext uri="{FF2B5EF4-FFF2-40B4-BE49-F238E27FC236}">
+                          <a16:creationId xmlns:a16="http://schemas.microsoft.com/office/drawing/2014/main" id="{EDFB8C7D-6F4A-330F-0A67-29B83A695608}"/>
+                        </a:ext>
+                      </a:extLst>
+                    </p:cNvPr>
+                    <p:cNvSpPr/>
+                    <p:nvPr/>
+                  </p:nvSpPr>
+                  <p:spPr>
+                    <a:xfrm>
+                      <a:off x="1412450" y="1954475"/>
+                      <a:ext cx="297750" cy="296175"/>
+                    </a:xfrm>
+                    <a:custGeom>
+                      <a:avLst/>
+                      <a:gdLst/>
+                      <a:ahLst/>
+                      <a:cxnLst/>
+                      <a:rect l="l" t="t" r="r" b="b"/>
+                      <a:pathLst>
+                        <a:path w="11910" h="11847" extrusionOk="0">
+                          <a:moveTo>
+                            <a:pt x="6365" y="662"/>
+                          </a:moveTo>
+                          <a:lnTo>
+                            <a:pt x="6522" y="1513"/>
+                          </a:lnTo>
+                          <a:cubicBezTo>
+                            <a:pt x="6554" y="1702"/>
+                            <a:pt x="6617" y="1765"/>
+                            <a:pt x="6774" y="1797"/>
+                          </a:cubicBezTo>
+                          <a:cubicBezTo>
+                            <a:pt x="7342" y="1923"/>
+                            <a:pt x="7814" y="2112"/>
+                            <a:pt x="8287" y="2427"/>
+                          </a:cubicBezTo>
+                          <a:cubicBezTo>
+                            <a:pt x="8350" y="2474"/>
+                            <a:pt x="8421" y="2498"/>
+                            <a:pt x="8488" y="2498"/>
+                          </a:cubicBezTo>
+                          <a:cubicBezTo>
+                            <a:pt x="8554" y="2498"/>
+                            <a:pt x="8618" y="2474"/>
+                            <a:pt x="8665" y="2427"/>
+                          </a:cubicBezTo>
+                          <a:lnTo>
+                            <a:pt x="9389" y="1923"/>
+                          </a:lnTo>
+                          <a:lnTo>
+                            <a:pt x="9925" y="2490"/>
+                          </a:lnTo>
+                          <a:lnTo>
+                            <a:pt x="9421" y="3183"/>
+                          </a:lnTo>
+                          <a:cubicBezTo>
+                            <a:pt x="9358" y="3309"/>
+                            <a:pt x="9358" y="3466"/>
+                            <a:pt x="9421" y="3592"/>
+                          </a:cubicBezTo>
+                          <a:cubicBezTo>
+                            <a:pt x="9736" y="4065"/>
+                            <a:pt x="9925" y="4537"/>
+                            <a:pt x="10051" y="5073"/>
+                          </a:cubicBezTo>
+                          <a:cubicBezTo>
+                            <a:pt x="10082" y="5231"/>
+                            <a:pt x="10209" y="5294"/>
+                            <a:pt x="10335" y="5357"/>
+                          </a:cubicBezTo>
+                          <a:lnTo>
+                            <a:pt x="11185" y="5514"/>
+                          </a:lnTo>
+                          <a:lnTo>
+                            <a:pt x="11185" y="6302"/>
+                          </a:lnTo>
+                          <a:lnTo>
+                            <a:pt x="10335" y="6459"/>
+                          </a:lnTo>
+                          <a:cubicBezTo>
+                            <a:pt x="10177" y="6491"/>
+                            <a:pt x="10082" y="6585"/>
+                            <a:pt x="10051" y="6743"/>
+                          </a:cubicBezTo>
+                          <a:cubicBezTo>
+                            <a:pt x="9925" y="7278"/>
+                            <a:pt x="9736" y="7751"/>
+                            <a:pt x="9421" y="8224"/>
+                          </a:cubicBezTo>
+                          <a:cubicBezTo>
+                            <a:pt x="9358" y="8350"/>
+                            <a:pt x="9358" y="8507"/>
+                            <a:pt x="9421" y="8633"/>
+                          </a:cubicBezTo>
+                          <a:lnTo>
+                            <a:pt x="9925" y="9326"/>
+                          </a:lnTo>
+                          <a:lnTo>
+                            <a:pt x="9389" y="9893"/>
+                          </a:lnTo>
+                          <a:lnTo>
+                            <a:pt x="8665" y="9358"/>
+                          </a:lnTo>
+                          <a:cubicBezTo>
+                            <a:pt x="8618" y="9326"/>
+                            <a:pt x="8554" y="9310"/>
+                            <a:pt x="8488" y="9310"/>
+                          </a:cubicBezTo>
+                          <a:cubicBezTo>
+                            <a:pt x="8421" y="9310"/>
+                            <a:pt x="8350" y="9326"/>
+                            <a:pt x="8287" y="9358"/>
+                          </a:cubicBezTo>
+                          <a:cubicBezTo>
+                            <a:pt x="7814" y="9673"/>
+                            <a:pt x="7342" y="9893"/>
+                            <a:pt x="6774" y="9988"/>
+                          </a:cubicBezTo>
+                          <a:cubicBezTo>
+                            <a:pt x="6617" y="10051"/>
+                            <a:pt x="6554" y="10145"/>
+                            <a:pt x="6522" y="10271"/>
+                          </a:cubicBezTo>
+                          <a:lnTo>
+                            <a:pt x="6365" y="11153"/>
+                          </a:lnTo>
+                          <a:lnTo>
+                            <a:pt x="5577" y="11153"/>
+                          </a:lnTo>
+                          <a:lnTo>
+                            <a:pt x="5420" y="10271"/>
+                          </a:lnTo>
+                          <a:cubicBezTo>
+                            <a:pt x="5357" y="10114"/>
+                            <a:pt x="5294" y="10051"/>
+                            <a:pt x="5136" y="9988"/>
+                          </a:cubicBezTo>
+                          <a:cubicBezTo>
+                            <a:pt x="4569" y="9893"/>
+                            <a:pt x="4097" y="9673"/>
+                            <a:pt x="3624" y="9358"/>
+                          </a:cubicBezTo>
+                          <a:cubicBezTo>
+                            <a:pt x="3561" y="9326"/>
+                            <a:pt x="3498" y="9310"/>
+                            <a:pt x="3435" y="9310"/>
+                          </a:cubicBezTo>
+                          <a:cubicBezTo>
+                            <a:pt x="3372" y="9310"/>
+                            <a:pt x="3309" y="9326"/>
+                            <a:pt x="3246" y="9358"/>
+                          </a:cubicBezTo>
+                          <a:lnTo>
+                            <a:pt x="2521" y="9893"/>
+                          </a:lnTo>
+                          <a:lnTo>
+                            <a:pt x="1986" y="9326"/>
+                          </a:lnTo>
+                          <a:lnTo>
+                            <a:pt x="2490" y="8633"/>
+                          </a:lnTo>
+                          <a:cubicBezTo>
+                            <a:pt x="2584" y="8507"/>
+                            <a:pt x="2584" y="8350"/>
+                            <a:pt x="2490" y="8224"/>
+                          </a:cubicBezTo>
+                          <a:cubicBezTo>
+                            <a:pt x="2175" y="7751"/>
+                            <a:pt x="1986" y="7278"/>
+                            <a:pt x="1860" y="6743"/>
+                          </a:cubicBezTo>
+                          <a:cubicBezTo>
+                            <a:pt x="1828" y="6585"/>
+                            <a:pt x="1702" y="6491"/>
+                            <a:pt x="1576" y="6459"/>
+                          </a:cubicBezTo>
+                          <a:lnTo>
+                            <a:pt x="726" y="6302"/>
+                          </a:lnTo>
+                          <a:lnTo>
+                            <a:pt x="726" y="5514"/>
+                          </a:lnTo>
+                          <a:lnTo>
+                            <a:pt x="1576" y="5357"/>
+                          </a:lnTo>
+                          <a:cubicBezTo>
+                            <a:pt x="1734" y="5325"/>
+                            <a:pt x="1828" y="5231"/>
+                            <a:pt x="1860" y="5073"/>
+                          </a:cubicBezTo>
+                          <a:cubicBezTo>
+                            <a:pt x="1986" y="4506"/>
+                            <a:pt x="2175" y="4065"/>
+                            <a:pt x="2490" y="3592"/>
+                          </a:cubicBezTo>
+                          <a:cubicBezTo>
+                            <a:pt x="2584" y="3466"/>
+                            <a:pt x="2584" y="3309"/>
+                            <a:pt x="2490" y="3183"/>
+                          </a:cubicBezTo>
+                          <a:lnTo>
+                            <a:pt x="1986" y="2490"/>
+                          </a:lnTo>
+                          <a:lnTo>
+                            <a:pt x="2521" y="1923"/>
+                          </a:lnTo>
+                          <a:lnTo>
+                            <a:pt x="3246" y="2427"/>
+                          </a:lnTo>
+                          <a:cubicBezTo>
+                            <a:pt x="3309" y="2474"/>
+                            <a:pt x="3372" y="2498"/>
+                            <a:pt x="3435" y="2498"/>
+                          </a:cubicBezTo>
+                          <a:cubicBezTo>
+                            <a:pt x="3498" y="2498"/>
+                            <a:pt x="3561" y="2474"/>
+                            <a:pt x="3624" y="2427"/>
+                          </a:cubicBezTo>
+                          <a:cubicBezTo>
+                            <a:pt x="4097" y="2112"/>
+                            <a:pt x="4569" y="1923"/>
+                            <a:pt x="5136" y="1797"/>
+                          </a:cubicBezTo>
+                          <a:cubicBezTo>
+                            <a:pt x="5294" y="1765"/>
+                            <a:pt x="5357" y="1639"/>
+                            <a:pt x="5420" y="1513"/>
+                          </a:cubicBezTo>
+                          <a:lnTo>
+                            <a:pt x="5577" y="662"/>
+                          </a:lnTo>
+                          <a:close/>
+                          <a:moveTo>
+                            <a:pt x="5262" y="1"/>
+                          </a:moveTo>
+                          <a:cubicBezTo>
+                            <a:pt x="5073" y="1"/>
+                            <a:pt x="4916" y="127"/>
+                            <a:pt x="4884" y="284"/>
+                          </a:cubicBezTo>
+                          <a:lnTo>
+                            <a:pt x="4727" y="1166"/>
+                          </a:lnTo>
+                          <a:cubicBezTo>
+                            <a:pt x="4254" y="1292"/>
+                            <a:pt x="3813" y="1481"/>
+                            <a:pt x="3435" y="1734"/>
+                          </a:cubicBezTo>
+                          <a:lnTo>
+                            <a:pt x="2679" y="1229"/>
+                          </a:lnTo>
+                          <a:cubicBezTo>
+                            <a:pt x="2610" y="1174"/>
+                            <a:pt x="2541" y="1149"/>
+                            <a:pt x="2474" y="1149"/>
+                          </a:cubicBezTo>
+                          <a:cubicBezTo>
+                            <a:pt x="2389" y="1149"/>
+                            <a:pt x="2309" y="1190"/>
+                            <a:pt x="2238" y="1261"/>
+                          </a:cubicBezTo>
+                          <a:lnTo>
+                            <a:pt x="1261" y="2238"/>
+                          </a:lnTo>
+                          <a:cubicBezTo>
+                            <a:pt x="1135" y="2364"/>
+                            <a:pt x="1135" y="2553"/>
+                            <a:pt x="1230" y="2679"/>
+                          </a:cubicBezTo>
+                          <a:lnTo>
+                            <a:pt x="1734" y="3435"/>
+                          </a:lnTo>
+                          <a:cubicBezTo>
+                            <a:pt x="1513" y="3813"/>
+                            <a:pt x="1324" y="4254"/>
+                            <a:pt x="1198" y="4726"/>
+                          </a:cubicBezTo>
+                          <a:lnTo>
+                            <a:pt x="284" y="4884"/>
+                          </a:lnTo>
+                          <a:cubicBezTo>
+                            <a:pt x="127" y="4915"/>
+                            <a:pt x="1" y="5042"/>
+                            <a:pt x="1" y="5231"/>
+                          </a:cubicBezTo>
+                          <a:lnTo>
+                            <a:pt x="1" y="6617"/>
+                          </a:lnTo>
+                          <a:cubicBezTo>
+                            <a:pt x="64" y="6774"/>
+                            <a:pt x="158" y="6932"/>
+                            <a:pt x="316" y="6963"/>
+                          </a:cubicBezTo>
+                          <a:lnTo>
+                            <a:pt x="1230" y="7121"/>
+                          </a:lnTo>
+                          <a:cubicBezTo>
+                            <a:pt x="1356" y="7593"/>
+                            <a:pt x="1545" y="8034"/>
+                            <a:pt x="1797" y="8413"/>
+                          </a:cubicBezTo>
+                          <a:lnTo>
+                            <a:pt x="1261" y="9169"/>
+                          </a:lnTo>
+                          <a:cubicBezTo>
+                            <a:pt x="1167" y="9295"/>
+                            <a:pt x="1198" y="9484"/>
+                            <a:pt x="1324" y="9610"/>
+                          </a:cubicBezTo>
+                          <a:lnTo>
+                            <a:pt x="2301" y="10586"/>
+                          </a:lnTo>
+                          <a:cubicBezTo>
+                            <a:pt x="2368" y="10654"/>
+                            <a:pt x="2454" y="10685"/>
+                            <a:pt x="2533" y="10685"/>
+                          </a:cubicBezTo>
+                          <a:cubicBezTo>
+                            <a:pt x="2602" y="10685"/>
+                            <a:pt x="2666" y="10662"/>
+                            <a:pt x="2710" y="10618"/>
+                          </a:cubicBezTo>
+                          <a:lnTo>
+                            <a:pt x="3466" y="10114"/>
+                          </a:lnTo>
+                          <a:cubicBezTo>
+                            <a:pt x="3876" y="10366"/>
+                            <a:pt x="4286" y="10555"/>
+                            <a:pt x="4790" y="10681"/>
+                          </a:cubicBezTo>
+                          <a:lnTo>
+                            <a:pt x="4947" y="11563"/>
+                          </a:lnTo>
+                          <a:cubicBezTo>
+                            <a:pt x="4979" y="11721"/>
+                            <a:pt x="5105" y="11847"/>
+                            <a:pt x="5294" y="11847"/>
+                          </a:cubicBezTo>
+                          <a:lnTo>
+                            <a:pt x="6680" y="11847"/>
+                          </a:lnTo>
+                          <a:cubicBezTo>
+                            <a:pt x="6837" y="11847"/>
+                            <a:pt x="6995" y="11721"/>
+                            <a:pt x="7027" y="11563"/>
+                          </a:cubicBezTo>
+                          <a:lnTo>
+                            <a:pt x="7184" y="10681"/>
+                          </a:lnTo>
+                          <a:cubicBezTo>
+                            <a:pt x="7657" y="10555"/>
+                            <a:pt x="8098" y="10366"/>
+                            <a:pt x="8476" y="10114"/>
+                          </a:cubicBezTo>
+                          <a:lnTo>
+                            <a:pt x="9232" y="10618"/>
+                          </a:lnTo>
+                          <a:cubicBezTo>
+                            <a:pt x="9301" y="10673"/>
+                            <a:pt x="9370" y="10698"/>
+                            <a:pt x="9436" y="10698"/>
+                          </a:cubicBezTo>
+                          <a:cubicBezTo>
+                            <a:pt x="9521" y="10698"/>
+                            <a:pt x="9602" y="10657"/>
+                            <a:pt x="9673" y="10586"/>
+                          </a:cubicBezTo>
+                          <a:lnTo>
+                            <a:pt x="10650" y="9610"/>
+                          </a:lnTo>
+                          <a:cubicBezTo>
+                            <a:pt x="10776" y="9484"/>
+                            <a:pt x="10776" y="9295"/>
+                            <a:pt x="10681" y="9169"/>
+                          </a:cubicBezTo>
+                          <a:lnTo>
+                            <a:pt x="10177" y="8413"/>
+                          </a:lnTo>
+                          <a:cubicBezTo>
+                            <a:pt x="10398" y="8034"/>
+                            <a:pt x="10618" y="7593"/>
+                            <a:pt x="10713" y="7121"/>
+                          </a:cubicBezTo>
+                          <a:lnTo>
+                            <a:pt x="11626" y="6963"/>
+                          </a:lnTo>
+                          <a:cubicBezTo>
+                            <a:pt x="11784" y="6932"/>
+                            <a:pt x="11910" y="6806"/>
+                            <a:pt x="11910" y="6617"/>
+                          </a:cubicBezTo>
+                          <a:lnTo>
+                            <a:pt x="11910" y="5231"/>
+                          </a:lnTo>
+                          <a:cubicBezTo>
+                            <a:pt x="11910" y="5073"/>
+                            <a:pt x="11784" y="4915"/>
+                            <a:pt x="11626" y="4884"/>
+                          </a:cubicBezTo>
+                          <a:lnTo>
+                            <a:pt x="10713" y="4726"/>
+                          </a:lnTo>
+                          <a:cubicBezTo>
+                            <a:pt x="10618" y="4254"/>
+                            <a:pt x="10398" y="3813"/>
+                            <a:pt x="10177" y="3403"/>
+                          </a:cubicBezTo>
+                          <a:lnTo>
+                            <a:pt x="10681" y="2679"/>
+                          </a:lnTo>
+                          <a:cubicBezTo>
+                            <a:pt x="10807" y="2553"/>
+                            <a:pt x="10776" y="2364"/>
+                            <a:pt x="10650" y="2238"/>
+                          </a:cubicBezTo>
+                          <a:lnTo>
+                            <a:pt x="9673" y="1261"/>
+                          </a:lnTo>
+                          <a:cubicBezTo>
+                            <a:pt x="9605" y="1193"/>
+                            <a:pt x="9520" y="1162"/>
+                            <a:pt x="9435" y="1162"/>
+                          </a:cubicBezTo>
+                          <a:cubicBezTo>
+                            <a:pt x="9362" y="1162"/>
+                            <a:pt x="9290" y="1186"/>
+                            <a:pt x="9232" y="1229"/>
+                          </a:cubicBezTo>
+                          <a:lnTo>
+                            <a:pt x="8476" y="1734"/>
+                          </a:lnTo>
+                          <a:cubicBezTo>
+                            <a:pt x="8098" y="1481"/>
+                            <a:pt x="7657" y="1292"/>
+                            <a:pt x="7184" y="1166"/>
+                          </a:cubicBezTo>
+                          <a:lnTo>
+                            <a:pt x="6995" y="284"/>
+                          </a:lnTo>
+                          <a:cubicBezTo>
+                            <a:pt x="6932" y="127"/>
+                            <a:pt x="6837" y="1"/>
+                            <a:pt x="6617" y="1"/>
+                          </a:cubicBezTo>
+                          <a:close/>
+                        </a:path>
+                      </a:pathLst>
+                    </a:custGeom>
+                    <a:solidFill>
+                      <a:schemeClr val="lt1"/>
+                    </a:solidFill>
+                    <a:ln>
+                      <a:noFill/>
+                    </a:ln>
+                  </p:spPr>
+                  <p:txBody>
+                    <a:bodyPr spcFirstLastPara="1" wrap="square" lIns="91425" tIns="91425" rIns="91425" bIns="91425" anchor="ctr" anchorCtr="0">
+                      <a:noAutofit/>
+                    </a:bodyPr>
+                    <a:lstStyle/>
+                    <a:p>
+                      <a:pPr marL="0" lvl="0" indent="0" algn="l" rtl="0">
+                        <a:spcBef>
+                          <a:spcPts val="0"/>
+                        </a:spcBef>
+                        <a:spcAft>
+                          <a:spcPts val="0"/>
+                        </a:spcAft>
+                        <a:buNone/>
+                      </a:pPr>
+                      <a:endParaRPr/>
+                    </a:p>
+                  </p:txBody>
+                </p:sp>
+              </p:grpSp>
+            </p:grpSp>
+            <p:grpSp>
+              <p:nvGrpSpPr>
+                <p:cNvPr id="21" name="Google Shape;134;p18">
+                  <a:extLst>
+                    <a:ext uri="{FF2B5EF4-FFF2-40B4-BE49-F238E27FC236}">
+                      <a16:creationId xmlns:a16="http://schemas.microsoft.com/office/drawing/2014/main" id="{BBA0A897-CBBC-666F-3E8A-15A59565417A}"/>
+                    </a:ext>
+                  </a:extLst>
+                </p:cNvPr>
+                <p:cNvGrpSpPr/>
+                <p:nvPr/>
+              </p:nvGrpSpPr>
+              <p:grpSpPr>
+                <a:xfrm>
+                  <a:off x="7315699" y="2259317"/>
+                  <a:ext cx="509699" cy="511630"/>
+                  <a:chOff x="7315699" y="2259317"/>
+                  <a:chExt cx="509699" cy="511630"/>
+                </a:xfrm>
+              </p:grpSpPr>
+              <p:sp>
+                <p:nvSpPr>
+                  <p:cNvPr id="22" name="Google Shape;135;p18">
+                    <a:extLst>
+                      <a:ext uri="{FF2B5EF4-FFF2-40B4-BE49-F238E27FC236}">
+                        <a16:creationId xmlns:a16="http://schemas.microsoft.com/office/drawing/2014/main" id="{1791954D-5B24-FB2A-ACDC-51A9A5C151BE}"/>
+                      </a:ext>
+                    </a:extLst>
+                  </p:cNvPr>
+                  <p:cNvSpPr/>
+                  <p:nvPr/>
+                </p:nvSpPr>
+                <p:spPr>
+                  <a:xfrm>
+                    <a:off x="7315699" y="2259317"/>
+                    <a:ext cx="509699" cy="511630"/>
+                  </a:xfrm>
+                  <a:custGeom>
+                    <a:avLst/>
+                    <a:gdLst/>
+                    <a:ahLst/>
+                    <a:cxnLst/>
+                    <a:rect l="l" t="t" r="r" b="b"/>
+                    <a:pathLst>
+                      <a:path w="6072" h="6095" extrusionOk="0">
+                        <a:moveTo>
+                          <a:pt x="3036" y="0"/>
+                        </a:moveTo>
+                        <a:cubicBezTo>
+                          <a:pt x="1324" y="0"/>
+                          <a:pt x="0" y="1415"/>
+                          <a:pt x="0" y="3036"/>
+                        </a:cubicBezTo>
+                        <a:cubicBezTo>
+                          <a:pt x="0" y="4748"/>
+                          <a:pt x="1324" y="6094"/>
+                          <a:pt x="3036" y="6094"/>
+                        </a:cubicBezTo>
+                        <a:cubicBezTo>
+                          <a:pt x="4656" y="6094"/>
+                          <a:pt x="6072" y="4748"/>
+                          <a:pt x="6072" y="3036"/>
+                        </a:cubicBezTo>
+                        <a:cubicBezTo>
+                          <a:pt x="6072" y="1415"/>
+                          <a:pt x="4656" y="0"/>
+                          <a:pt x="3036" y="0"/>
+                        </a:cubicBezTo>
+                        <a:close/>
+                      </a:path>
+                    </a:pathLst>
+                  </a:custGeom>
+                  <a:solidFill>
+                    <a:schemeClr val="accent1"/>
+                  </a:solidFill>
+                  <a:ln>
+                    <a:noFill/>
+                  </a:ln>
+                </p:spPr>
+                <p:txBody>
+                  <a:bodyPr spcFirstLastPara="1" wrap="square" lIns="91425" tIns="91425" rIns="91425" bIns="91425" anchor="ctr" anchorCtr="0">
+                    <a:noAutofit/>
+                  </a:bodyPr>
+                  <a:lstStyle/>
+                  <a:p>
+                    <a:pPr marL="0" lvl="0" indent="0" algn="l" rtl="0">
+                      <a:spcBef>
+                        <a:spcPts val="0"/>
+                      </a:spcBef>
+                      <a:spcAft>
+                        <a:spcPts val="0"/>
+                      </a:spcAft>
+                      <a:buNone/>
+                    </a:pPr>
+                    <a:endParaRPr/>
+                  </a:p>
+                </p:txBody>
+              </p:sp>
+              <p:grpSp>
+                <p:nvGrpSpPr>
+                  <p:cNvPr id="23" name="Google Shape;136;p18">
+                    <a:extLst>
+                      <a:ext uri="{FF2B5EF4-FFF2-40B4-BE49-F238E27FC236}">
+                        <a16:creationId xmlns:a16="http://schemas.microsoft.com/office/drawing/2014/main" id="{C4954E46-CD9C-DCB5-0F6B-8F21BFEDC5E6}"/>
+                      </a:ext>
+                    </a:extLst>
+                  </p:cNvPr>
+                  <p:cNvGrpSpPr/>
+                  <p:nvPr/>
+                </p:nvGrpSpPr>
+                <p:grpSpPr>
+                  <a:xfrm>
+                    <a:off x="7406513" y="2340418"/>
+                    <a:ext cx="328071" cy="349427"/>
+                    <a:chOff x="5421475" y="1945825"/>
+                    <a:chExt cx="278050" cy="296150"/>
+                  </a:xfrm>
+                </p:grpSpPr>
+                <p:sp>
+                  <p:nvSpPr>
+                    <p:cNvPr id="24" name="Google Shape;137;p18">
+                      <a:extLst>
+                        <a:ext uri="{FF2B5EF4-FFF2-40B4-BE49-F238E27FC236}">
+                          <a16:creationId xmlns:a16="http://schemas.microsoft.com/office/drawing/2014/main" id="{B8528946-F9E5-7B2C-3DB2-753B035FD6B3}"/>
+                        </a:ext>
+                      </a:extLst>
+                    </p:cNvPr>
+                    <p:cNvSpPr/>
+                    <p:nvPr/>
+                  </p:nvSpPr>
+                  <p:spPr>
+                    <a:xfrm>
+                      <a:off x="5472650" y="1999375"/>
+                      <a:ext cx="172525" cy="242600"/>
+                    </a:xfrm>
+                    <a:custGeom>
+                      <a:avLst/>
+                      <a:gdLst/>
+                      <a:ahLst/>
+                      <a:cxnLst/>
+                      <a:rect l="l" t="t" r="r" b="b"/>
+                      <a:pathLst>
+                        <a:path w="6901" h="9704" extrusionOk="0">
+                          <a:moveTo>
+                            <a:pt x="1765" y="1355"/>
+                          </a:moveTo>
+                          <a:cubicBezTo>
+                            <a:pt x="1986" y="1355"/>
+                            <a:pt x="2143" y="1513"/>
+                            <a:pt x="2143" y="1702"/>
+                          </a:cubicBezTo>
+                          <a:lnTo>
+                            <a:pt x="2143" y="2048"/>
+                          </a:lnTo>
+                          <a:lnTo>
+                            <a:pt x="1765" y="2048"/>
+                          </a:lnTo>
+                          <a:cubicBezTo>
+                            <a:pt x="1671" y="2048"/>
+                            <a:pt x="1545" y="2048"/>
+                            <a:pt x="1419" y="2111"/>
+                          </a:cubicBezTo>
+                          <a:lnTo>
+                            <a:pt x="1419" y="1702"/>
+                          </a:lnTo>
+                          <a:cubicBezTo>
+                            <a:pt x="1419" y="1513"/>
+                            <a:pt x="1576" y="1355"/>
+                            <a:pt x="1765" y="1355"/>
+                          </a:cubicBezTo>
+                          <a:close/>
+                          <a:moveTo>
+                            <a:pt x="3151" y="631"/>
+                          </a:moveTo>
+                          <a:cubicBezTo>
+                            <a:pt x="3341" y="631"/>
+                            <a:pt x="3498" y="788"/>
+                            <a:pt x="3498" y="1009"/>
+                          </a:cubicBezTo>
+                          <a:lnTo>
+                            <a:pt x="3498" y="2111"/>
+                          </a:lnTo>
+                          <a:cubicBezTo>
+                            <a:pt x="3404" y="2048"/>
+                            <a:pt x="3277" y="2017"/>
+                            <a:pt x="3151" y="2017"/>
+                          </a:cubicBezTo>
+                          <a:lnTo>
+                            <a:pt x="2805" y="2017"/>
+                          </a:lnTo>
+                          <a:lnTo>
+                            <a:pt x="2805" y="1009"/>
+                          </a:lnTo>
+                          <a:cubicBezTo>
+                            <a:pt x="2805" y="788"/>
+                            <a:pt x="2962" y="631"/>
+                            <a:pt x="3151" y="631"/>
+                          </a:cubicBezTo>
+                          <a:close/>
+                          <a:moveTo>
+                            <a:pt x="4538" y="1355"/>
+                          </a:moveTo>
+                          <a:cubicBezTo>
+                            <a:pt x="4727" y="1355"/>
+                            <a:pt x="4884" y="1513"/>
+                            <a:pt x="4884" y="1702"/>
+                          </a:cubicBezTo>
+                          <a:lnTo>
+                            <a:pt x="4884" y="3088"/>
+                          </a:lnTo>
+                          <a:cubicBezTo>
+                            <a:pt x="4884" y="3277"/>
+                            <a:pt x="4727" y="3435"/>
+                            <a:pt x="4538" y="3435"/>
+                          </a:cubicBezTo>
+                          <a:cubicBezTo>
+                            <a:pt x="4349" y="3435"/>
+                            <a:pt x="4191" y="3277"/>
+                            <a:pt x="4191" y="3088"/>
+                          </a:cubicBezTo>
+                          <a:lnTo>
+                            <a:pt x="4191" y="1702"/>
+                          </a:lnTo>
+                          <a:cubicBezTo>
+                            <a:pt x="4191" y="1513"/>
+                            <a:pt x="4349" y="1355"/>
+                            <a:pt x="4538" y="1355"/>
+                          </a:cubicBezTo>
+                          <a:close/>
+                          <a:moveTo>
+                            <a:pt x="5924" y="2017"/>
+                          </a:moveTo>
+                          <a:cubicBezTo>
+                            <a:pt x="6113" y="2017"/>
+                            <a:pt x="6270" y="2174"/>
+                            <a:pt x="6270" y="2363"/>
+                          </a:cubicBezTo>
+                          <a:lnTo>
+                            <a:pt x="6270" y="3088"/>
+                          </a:lnTo>
+                          <a:cubicBezTo>
+                            <a:pt x="6270" y="3277"/>
+                            <a:pt x="6113" y="3435"/>
+                            <a:pt x="5924" y="3435"/>
+                          </a:cubicBezTo>
+                          <a:cubicBezTo>
+                            <a:pt x="5703" y="3435"/>
+                            <a:pt x="5546" y="3277"/>
+                            <a:pt x="5546" y="3088"/>
+                          </a:cubicBezTo>
+                          <a:lnTo>
+                            <a:pt x="5546" y="2363"/>
+                          </a:lnTo>
+                          <a:cubicBezTo>
+                            <a:pt x="5546" y="2174"/>
+                            <a:pt x="5703" y="2017"/>
+                            <a:pt x="5924" y="2017"/>
+                          </a:cubicBezTo>
+                          <a:close/>
+                          <a:moveTo>
+                            <a:pt x="3120" y="2741"/>
+                          </a:moveTo>
+                          <a:cubicBezTo>
+                            <a:pt x="3309" y="2741"/>
+                            <a:pt x="3467" y="2899"/>
+                            <a:pt x="3467" y="3088"/>
+                          </a:cubicBezTo>
+                          <a:cubicBezTo>
+                            <a:pt x="3467" y="3277"/>
+                            <a:pt x="3309" y="3435"/>
+                            <a:pt x="3120" y="3435"/>
+                          </a:cubicBezTo>
+                          <a:lnTo>
+                            <a:pt x="1734" y="3435"/>
+                          </a:lnTo>
+                          <a:cubicBezTo>
+                            <a:pt x="1545" y="3435"/>
+                            <a:pt x="1387" y="3592"/>
+                            <a:pt x="1387" y="3781"/>
+                          </a:cubicBezTo>
+                          <a:cubicBezTo>
+                            <a:pt x="1387" y="4002"/>
+                            <a:pt x="1545" y="4159"/>
+                            <a:pt x="1734" y="4159"/>
+                          </a:cubicBezTo>
+                          <a:cubicBezTo>
+                            <a:pt x="2679" y="4159"/>
+                            <a:pt x="3467" y="4947"/>
+                            <a:pt x="3467" y="5892"/>
+                          </a:cubicBezTo>
+                          <a:cubicBezTo>
+                            <a:pt x="3467" y="6081"/>
+                            <a:pt x="3624" y="6238"/>
+                            <a:pt x="3845" y="6238"/>
+                          </a:cubicBezTo>
+                          <a:cubicBezTo>
+                            <a:pt x="4034" y="6238"/>
+                            <a:pt x="4191" y="6081"/>
+                            <a:pt x="4191" y="5892"/>
+                          </a:cubicBezTo>
+                          <a:cubicBezTo>
+                            <a:pt x="4191" y="5167"/>
+                            <a:pt x="3876" y="4537"/>
+                            <a:pt x="3435" y="4096"/>
+                          </a:cubicBezTo>
+                          <a:cubicBezTo>
+                            <a:pt x="3593" y="4065"/>
+                            <a:pt x="3750" y="4002"/>
+                            <a:pt x="3876" y="3876"/>
+                          </a:cubicBezTo>
+                          <a:cubicBezTo>
+                            <a:pt x="4065" y="4033"/>
+                            <a:pt x="4317" y="4159"/>
+                            <a:pt x="4569" y="4159"/>
+                          </a:cubicBezTo>
+                          <a:cubicBezTo>
+                            <a:pt x="4853" y="4159"/>
+                            <a:pt x="5073" y="4033"/>
+                            <a:pt x="5294" y="3876"/>
+                          </a:cubicBezTo>
+                          <a:cubicBezTo>
+                            <a:pt x="5483" y="4033"/>
+                            <a:pt x="5703" y="4159"/>
+                            <a:pt x="5987" y="4159"/>
+                          </a:cubicBezTo>
+                          <a:cubicBezTo>
+                            <a:pt x="6113" y="4159"/>
+                            <a:pt x="6239" y="4096"/>
+                            <a:pt x="6333" y="4065"/>
+                          </a:cubicBezTo>
+                          <a:lnTo>
+                            <a:pt x="6333" y="5167"/>
+                          </a:lnTo>
+                          <a:cubicBezTo>
+                            <a:pt x="6333" y="5923"/>
+                            <a:pt x="5861" y="6554"/>
+                            <a:pt x="5199" y="6774"/>
+                          </a:cubicBezTo>
+                          <a:cubicBezTo>
+                            <a:pt x="5042" y="6837"/>
+                            <a:pt x="4979" y="6995"/>
+                            <a:pt x="4979" y="7089"/>
+                          </a:cubicBezTo>
+                          <a:lnTo>
+                            <a:pt x="4979" y="7562"/>
+                          </a:lnTo>
+                          <a:lnTo>
+                            <a:pt x="2206" y="7562"/>
+                          </a:lnTo>
+                          <a:lnTo>
+                            <a:pt x="2206" y="7089"/>
+                          </a:lnTo>
+                          <a:cubicBezTo>
+                            <a:pt x="2206" y="6932"/>
+                            <a:pt x="2143" y="6837"/>
+                            <a:pt x="1986" y="6774"/>
+                          </a:cubicBezTo>
+                          <a:cubicBezTo>
+                            <a:pt x="1261" y="6554"/>
+                            <a:pt x="820" y="5892"/>
+                            <a:pt x="820" y="5167"/>
+                          </a:cubicBezTo>
+                          <a:lnTo>
+                            <a:pt x="820" y="3750"/>
+                          </a:lnTo>
+                          <a:lnTo>
+                            <a:pt x="726" y="3750"/>
+                          </a:lnTo>
+                          <a:cubicBezTo>
+                            <a:pt x="726" y="3151"/>
+                            <a:pt x="1198" y="2741"/>
+                            <a:pt x="1734" y="2741"/>
+                          </a:cubicBezTo>
+                          <a:close/>
+                          <a:moveTo>
+                            <a:pt x="5199" y="8286"/>
+                          </a:moveTo>
+                          <a:cubicBezTo>
+                            <a:pt x="5388" y="8286"/>
+                            <a:pt x="5546" y="8444"/>
+                            <a:pt x="5546" y="8633"/>
+                          </a:cubicBezTo>
+                          <a:lnTo>
+                            <a:pt x="5546" y="8979"/>
+                          </a:lnTo>
+                          <a:lnTo>
+                            <a:pt x="1387" y="8979"/>
+                          </a:lnTo>
+                          <a:lnTo>
+                            <a:pt x="1387" y="8633"/>
+                          </a:lnTo>
+                          <a:cubicBezTo>
+                            <a:pt x="1387" y="8444"/>
+                            <a:pt x="1545" y="8286"/>
+                            <a:pt x="1734" y="8286"/>
+                          </a:cubicBezTo>
+                          <a:close/>
+                          <a:moveTo>
+                            <a:pt x="3120" y="1"/>
+                          </a:moveTo>
+                          <a:cubicBezTo>
+                            <a:pt x="2647" y="1"/>
+                            <a:pt x="2269" y="316"/>
+                            <a:pt x="2143" y="757"/>
+                          </a:cubicBezTo>
+                          <a:cubicBezTo>
+                            <a:pt x="2017" y="725"/>
+                            <a:pt x="1891" y="694"/>
+                            <a:pt x="1734" y="694"/>
+                          </a:cubicBezTo>
+                          <a:cubicBezTo>
+                            <a:pt x="1167" y="694"/>
+                            <a:pt x="726" y="1166"/>
+                            <a:pt x="726" y="1702"/>
+                          </a:cubicBezTo>
+                          <a:lnTo>
+                            <a:pt x="726" y="2426"/>
+                          </a:lnTo>
+                          <a:cubicBezTo>
+                            <a:pt x="285" y="2678"/>
+                            <a:pt x="1" y="3214"/>
+                            <a:pt x="1" y="3750"/>
+                          </a:cubicBezTo>
+                          <a:lnTo>
+                            <a:pt x="1" y="5136"/>
+                          </a:lnTo>
+                          <a:cubicBezTo>
+                            <a:pt x="1" y="6081"/>
+                            <a:pt x="568" y="6932"/>
+                            <a:pt x="1387" y="7341"/>
+                          </a:cubicBezTo>
+                          <a:lnTo>
+                            <a:pt x="1387" y="7656"/>
+                          </a:lnTo>
+                          <a:cubicBezTo>
+                            <a:pt x="1009" y="7814"/>
+                            <a:pt x="694" y="8160"/>
+                            <a:pt x="694" y="8633"/>
+                          </a:cubicBezTo>
+                          <a:lnTo>
+                            <a:pt x="694" y="9357"/>
+                          </a:lnTo>
+                          <a:cubicBezTo>
+                            <a:pt x="694" y="9546"/>
+                            <a:pt x="852" y="9704"/>
+                            <a:pt x="1041" y="9704"/>
+                          </a:cubicBezTo>
+                          <a:lnTo>
+                            <a:pt x="5892" y="9704"/>
+                          </a:lnTo>
+                          <a:cubicBezTo>
+                            <a:pt x="6081" y="9704"/>
+                            <a:pt x="6239" y="9546"/>
+                            <a:pt x="6239" y="9357"/>
+                          </a:cubicBezTo>
+                          <a:lnTo>
+                            <a:pt x="6239" y="8633"/>
+                          </a:lnTo>
+                          <a:cubicBezTo>
+                            <a:pt x="6239" y="8192"/>
+                            <a:pt x="5955" y="7814"/>
+                            <a:pt x="5514" y="7656"/>
+                          </a:cubicBezTo>
+                          <a:lnTo>
+                            <a:pt x="5514" y="7341"/>
+                          </a:lnTo>
+                          <a:cubicBezTo>
+                            <a:pt x="6365" y="6932"/>
+                            <a:pt x="6901" y="6081"/>
+                            <a:pt x="6901" y="5136"/>
+                          </a:cubicBezTo>
+                          <a:lnTo>
+                            <a:pt x="6901" y="2363"/>
+                          </a:lnTo>
+                          <a:cubicBezTo>
+                            <a:pt x="6901" y="1796"/>
+                            <a:pt x="6428" y="1355"/>
+                            <a:pt x="5892" y="1355"/>
+                          </a:cubicBezTo>
+                          <a:cubicBezTo>
+                            <a:pt x="5766" y="1355"/>
+                            <a:pt x="5609" y="1387"/>
+                            <a:pt x="5483" y="1418"/>
+                          </a:cubicBezTo>
+                          <a:cubicBezTo>
+                            <a:pt x="5357" y="1009"/>
+                            <a:pt x="4979" y="694"/>
+                            <a:pt x="4506" y="694"/>
+                          </a:cubicBezTo>
+                          <a:cubicBezTo>
+                            <a:pt x="4380" y="694"/>
+                            <a:pt x="4223" y="725"/>
+                            <a:pt x="4097" y="757"/>
+                          </a:cubicBezTo>
+                          <a:cubicBezTo>
+                            <a:pt x="4002" y="316"/>
+                            <a:pt x="3593" y="1"/>
+                            <a:pt x="3120" y="1"/>
+                          </a:cubicBezTo>
+                          <a:close/>
+                        </a:path>
+                      </a:pathLst>
+                    </a:custGeom>
+                    <a:solidFill>
+                      <a:schemeClr val="lt1"/>
+                    </a:solidFill>
+                    <a:ln>
+                      <a:noFill/>
+                    </a:ln>
+                  </p:spPr>
+                  <p:txBody>
+                    <a:bodyPr spcFirstLastPara="1" wrap="square" lIns="91425" tIns="91425" rIns="91425" bIns="91425" anchor="ctr" anchorCtr="0">
+                      <a:noAutofit/>
+                    </a:bodyPr>
+                    <a:lstStyle/>
+                    <a:p>
+                      <a:pPr marL="0" lvl="0" indent="0" algn="l" rtl="0">
+                        <a:spcBef>
+                          <a:spcPts val="0"/>
+                        </a:spcBef>
+                        <a:spcAft>
+                          <a:spcPts val="0"/>
+                        </a:spcAft>
+                        <a:buNone/>
+                      </a:pPr>
+                      <a:endParaRPr/>
+                    </a:p>
+                  </p:txBody>
+                </p:sp>
+                <p:sp>
+                  <p:nvSpPr>
+                    <p:cNvPr id="25" name="Google Shape;138;p18">
+                      <a:extLst>
+                        <a:ext uri="{FF2B5EF4-FFF2-40B4-BE49-F238E27FC236}">
+                          <a16:creationId xmlns:a16="http://schemas.microsoft.com/office/drawing/2014/main" id="{3C68FEBC-2AE7-9B3F-4740-1D1F899DE773}"/>
+                        </a:ext>
+                      </a:extLst>
+                    </p:cNvPr>
+                    <p:cNvSpPr/>
+                    <p:nvPr/>
+                  </p:nvSpPr>
+                  <p:spPr>
+                    <a:xfrm>
+                      <a:off x="5559300" y="1945825"/>
+                      <a:ext cx="18150" cy="44125"/>
+                    </a:xfrm>
+                    <a:custGeom>
+                      <a:avLst/>
+                      <a:gdLst/>
+                      <a:ahLst/>
+                      <a:cxnLst/>
+                      <a:rect l="l" t="t" r="r" b="b"/>
+                      <a:pathLst>
+                        <a:path w="726" h="1765" extrusionOk="0">
+                          <a:moveTo>
+                            <a:pt x="379" y="0"/>
+                          </a:moveTo>
+                          <a:cubicBezTo>
+                            <a:pt x="158" y="0"/>
+                            <a:pt x="1" y="158"/>
+                            <a:pt x="1" y="347"/>
+                          </a:cubicBezTo>
+                          <a:lnTo>
+                            <a:pt x="1" y="1418"/>
+                          </a:lnTo>
+                          <a:cubicBezTo>
+                            <a:pt x="1" y="1607"/>
+                            <a:pt x="158" y="1764"/>
+                            <a:pt x="379" y="1764"/>
+                          </a:cubicBezTo>
+                          <a:cubicBezTo>
+                            <a:pt x="568" y="1764"/>
+                            <a:pt x="725" y="1607"/>
+                            <a:pt x="725" y="1418"/>
+                          </a:cubicBezTo>
+                          <a:lnTo>
+                            <a:pt x="725" y="347"/>
+                          </a:lnTo>
+                          <a:cubicBezTo>
+                            <a:pt x="725" y="158"/>
+                            <a:pt x="568" y="0"/>
+                            <a:pt x="379" y="0"/>
+                          </a:cubicBezTo>
+                          <a:close/>
+                        </a:path>
+                      </a:pathLst>
+                    </a:custGeom>
+                    <a:solidFill>
+                      <a:schemeClr val="lt1"/>
+                    </a:solidFill>
+                    <a:ln>
+                      <a:noFill/>
+                    </a:ln>
+                  </p:spPr>
+                  <p:txBody>
+                    <a:bodyPr spcFirstLastPara="1" wrap="square" lIns="91425" tIns="91425" rIns="91425" bIns="91425" anchor="ctr" anchorCtr="0">
+                      <a:noAutofit/>
+                    </a:bodyPr>
+                    <a:lstStyle/>
+                    <a:p>
+                      <a:pPr marL="0" lvl="0" indent="0" algn="l" rtl="0">
+                        <a:spcBef>
+                          <a:spcPts val="0"/>
+                        </a:spcBef>
+                        <a:spcAft>
+                          <a:spcPts val="0"/>
+                        </a:spcAft>
+                        <a:buNone/>
+                      </a:pPr>
+                      <a:endParaRPr/>
+                    </a:p>
+                  </p:txBody>
+                </p:sp>
+                <p:sp>
+                  <p:nvSpPr>
+                    <p:cNvPr id="26" name="Google Shape;139;p18">
+                      <a:extLst>
+                        <a:ext uri="{FF2B5EF4-FFF2-40B4-BE49-F238E27FC236}">
+                          <a16:creationId xmlns:a16="http://schemas.microsoft.com/office/drawing/2014/main" id="{71C6FB44-D782-FAAF-068D-F402F3A20279}"/>
+                        </a:ext>
+                      </a:extLst>
+                    </p:cNvPr>
+                    <p:cNvSpPr/>
+                    <p:nvPr/>
+                  </p:nvSpPr>
+                  <p:spPr>
+                    <a:xfrm>
+                      <a:off x="5611275" y="1963925"/>
+                      <a:ext cx="35475" cy="34500"/>
+                    </a:xfrm>
+                    <a:custGeom>
+                      <a:avLst/>
+                      <a:gdLst/>
+                      <a:ahLst/>
+                      <a:cxnLst/>
+                      <a:rect l="l" t="t" r="r" b="b"/>
+                      <a:pathLst>
+                        <a:path w="1419" h="1380" extrusionOk="0">
+                          <a:moveTo>
+                            <a:pt x="1076" y="1"/>
+                          </a:moveTo>
+                          <a:cubicBezTo>
+                            <a:pt x="985" y="1"/>
+                            <a:pt x="899" y="32"/>
+                            <a:pt x="851" y="95"/>
+                          </a:cubicBezTo>
+                          <a:lnTo>
+                            <a:pt x="127" y="788"/>
+                          </a:lnTo>
+                          <a:cubicBezTo>
+                            <a:pt x="1" y="914"/>
+                            <a:pt x="1" y="1166"/>
+                            <a:pt x="127" y="1261"/>
+                          </a:cubicBezTo>
+                          <a:cubicBezTo>
+                            <a:pt x="190" y="1340"/>
+                            <a:pt x="284" y="1379"/>
+                            <a:pt x="375" y="1379"/>
+                          </a:cubicBezTo>
+                          <a:cubicBezTo>
+                            <a:pt x="466" y="1379"/>
+                            <a:pt x="552" y="1340"/>
+                            <a:pt x="599" y="1261"/>
+                          </a:cubicBezTo>
+                          <a:lnTo>
+                            <a:pt x="1324" y="568"/>
+                          </a:lnTo>
+                          <a:cubicBezTo>
+                            <a:pt x="1419" y="442"/>
+                            <a:pt x="1419" y="221"/>
+                            <a:pt x="1324" y="95"/>
+                          </a:cubicBezTo>
+                          <a:cubicBezTo>
+                            <a:pt x="1261" y="32"/>
+                            <a:pt x="1167" y="1"/>
+                            <a:pt x="1076" y="1"/>
+                          </a:cubicBezTo>
+                          <a:close/>
+                        </a:path>
+                      </a:pathLst>
+                    </a:custGeom>
+                    <a:solidFill>
+                      <a:schemeClr val="lt1"/>
+                    </a:solidFill>
+                    <a:ln>
+                      <a:noFill/>
+                    </a:ln>
+                  </p:spPr>
+                  <p:txBody>
+                    <a:bodyPr spcFirstLastPara="1" wrap="square" lIns="91425" tIns="91425" rIns="91425" bIns="91425" anchor="ctr" anchorCtr="0">
+                      <a:noAutofit/>
+                    </a:bodyPr>
+                    <a:lstStyle/>
+                    <a:p>
+                      <a:pPr marL="0" lvl="0" indent="0" algn="l" rtl="0">
+                        <a:spcBef>
+                          <a:spcPts val="0"/>
+                        </a:spcBef>
+                        <a:spcAft>
+                          <a:spcPts val="0"/>
+                        </a:spcAft>
+                        <a:buNone/>
+                      </a:pPr>
+                      <a:endParaRPr/>
+                    </a:p>
+                  </p:txBody>
+                </p:sp>
+                <p:sp>
+                  <p:nvSpPr>
+                    <p:cNvPr id="27" name="Google Shape;140;p18">
+                      <a:extLst>
+                        <a:ext uri="{FF2B5EF4-FFF2-40B4-BE49-F238E27FC236}">
+                          <a16:creationId xmlns:a16="http://schemas.microsoft.com/office/drawing/2014/main" id="{4E2777BF-097D-14FD-B41B-D1D8BAE147A8}"/>
+                        </a:ext>
+                      </a:extLst>
+                    </p:cNvPr>
+                    <p:cNvSpPr/>
+                    <p:nvPr/>
+                  </p:nvSpPr>
+                  <p:spPr>
+                    <a:xfrm>
+                      <a:off x="5664050" y="2067900"/>
+                      <a:ext cx="35475" cy="17350"/>
+                    </a:xfrm>
+                    <a:custGeom>
+                      <a:avLst/>
+                      <a:gdLst/>
+                      <a:ahLst/>
+                      <a:cxnLst/>
+                      <a:rect l="l" t="t" r="r" b="b"/>
+                      <a:pathLst>
+                        <a:path w="1419" h="694" extrusionOk="0">
+                          <a:moveTo>
+                            <a:pt x="347" y="0"/>
+                          </a:moveTo>
+                          <a:cubicBezTo>
+                            <a:pt x="158" y="0"/>
+                            <a:pt x="1" y="158"/>
+                            <a:pt x="1" y="347"/>
+                          </a:cubicBezTo>
+                          <a:cubicBezTo>
+                            <a:pt x="1" y="536"/>
+                            <a:pt x="158" y="694"/>
+                            <a:pt x="347" y="694"/>
+                          </a:cubicBezTo>
+                          <a:lnTo>
+                            <a:pt x="1040" y="694"/>
+                          </a:lnTo>
+                          <a:cubicBezTo>
+                            <a:pt x="1261" y="694"/>
+                            <a:pt x="1418" y="536"/>
+                            <a:pt x="1418" y="347"/>
+                          </a:cubicBezTo>
+                          <a:cubicBezTo>
+                            <a:pt x="1418" y="158"/>
+                            <a:pt x="1261" y="0"/>
+                            <a:pt x="1040" y="0"/>
+                          </a:cubicBezTo>
+                          <a:close/>
+                        </a:path>
+                      </a:pathLst>
+                    </a:custGeom>
+                    <a:solidFill>
+                      <a:schemeClr val="lt1"/>
+                    </a:solidFill>
+                    <a:ln>
+                      <a:noFill/>
+                    </a:ln>
+                  </p:spPr>
+                  <p:txBody>
+                    <a:bodyPr spcFirstLastPara="1" wrap="square" lIns="91425" tIns="91425" rIns="91425" bIns="91425" anchor="ctr" anchorCtr="0">
+                      <a:noAutofit/>
+                    </a:bodyPr>
+                    <a:lstStyle/>
+                    <a:p>
+                      <a:pPr marL="0" lvl="0" indent="0" algn="l" rtl="0">
+                        <a:spcBef>
+                          <a:spcPts val="0"/>
+                        </a:spcBef>
+                        <a:spcAft>
+                          <a:spcPts val="0"/>
+                        </a:spcAft>
+                        <a:buNone/>
+                      </a:pPr>
+                      <a:endParaRPr/>
+                    </a:p>
+                  </p:txBody>
+                </p:sp>
+                <p:sp>
+                  <p:nvSpPr>
+                    <p:cNvPr id="28" name="Google Shape;141;p18">
+                      <a:extLst>
+                        <a:ext uri="{FF2B5EF4-FFF2-40B4-BE49-F238E27FC236}">
+                          <a16:creationId xmlns:a16="http://schemas.microsoft.com/office/drawing/2014/main" id="{7E579F9C-5D32-DE84-74B2-16CBB196BD66}"/>
+                        </a:ext>
+                      </a:extLst>
+                    </p:cNvPr>
+                    <p:cNvSpPr/>
+                    <p:nvPr/>
+                  </p:nvSpPr>
+                  <p:spPr>
+                    <a:xfrm>
+                      <a:off x="5421475" y="2067900"/>
+                      <a:ext cx="35450" cy="17350"/>
+                    </a:xfrm>
+                    <a:custGeom>
+                      <a:avLst/>
+                      <a:gdLst/>
+                      <a:ahLst/>
+                      <a:cxnLst/>
+                      <a:rect l="l" t="t" r="r" b="b"/>
+                      <a:pathLst>
+                        <a:path w="1418" h="694" extrusionOk="0">
+                          <a:moveTo>
+                            <a:pt x="378" y="0"/>
+                          </a:moveTo>
+                          <a:cubicBezTo>
+                            <a:pt x="158" y="0"/>
+                            <a:pt x="0" y="158"/>
+                            <a:pt x="0" y="347"/>
+                          </a:cubicBezTo>
+                          <a:cubicBezTo>
+                            <a:pt x="0" y="536"/>
+                            <a:pt x="158" y="694"/>
+                            <a:pt x="378" y="694"/>
+                          </a:cubicBezTo>
+                          <a:lnTo>
+                            <a:pt x="1071" y="694"/>
+                          </a:lnTo>
+                          <a:cubicBezTo>
+                            <a:pt x="1260" y="694"/>
+                            <a:pt x="1418" y="536"/>
+                            <a:pt x="1418" y="347"/>
+                          </a:cubicBezTo>
+                          <a:cubicBezTo>
+                            <a:pt x="1418" y="158"/>
+                            <a:pt x="1260" y="0"/>
+                            <a:pt x="1071" y="0"/>
+                          </a:cubicBezTo>
+                          <a:close/>
+                        </a:path>
+                      </a:pathLst>
+                    </a:custGeom>
+                    <a:solidFill>
+                      <a:schemeClr val="lt1"/>
+                    </a:solidFill>
+                    <a:ln>
+                      <a:noFill/>
+                    </a:ln>
+                  </p:spPr>
+                  <p:txBody>
+                    <a:bodyPr spcFirstLastPara="1" wrap="square" lIns="91425" tIns="91425" rIns="91425" bIns="91425" anchor="ctr" anchorCtr="0">
+                      <a:noAutofit/>
+                    </a:bodyPr>
+                    <a:lstStyle/>
+                    <a:p>
+                      <a:pPr marL="0" lvl="0" indent="0" algn="l" rtl="0">
+                        <a:spcBef>
+                          <a:spcPts val="0"/>
+                        </a:spcBef>
+                        <a:spcAft>
+                          <a:spcPts val="0"/>
+                        </a:spcAft>
+                        <a:buNone/>
+                      </a:pPr>
+                      <a:endParaRPr/>
+                    </a:p>
+                  </p:txBody>
+                </p:sp>
+                <p:sp>
+                  <p:nvSpPr>
+                    <p:cNvPr id="29" name="Google Shape;142;p18">
+                      <a:extLst>
+                        <a:ext uri="{FF2B5EF4-FFF2-40B4-BE49-F238E27FC236}">
+                          <a16:creationId xmlns:a16="http://schemas.microsoft.com/office/drawing/2014/main" id="{C63C7A69-5395-2915-E0E7-69F718E147AD}"/>
+                        </a:ext>
+                      </a:extLst>
+                    </p:cNvPr>
+                    <p:cNvSpPr/>
+                    <p:nvPr/>
+                  </p:nvSpPr>
+                  <p:spPr>
+                    <a:xfrm>
+                      <a:off x="5490000" y="1963925"/>
+                      <a:ext cx="35450" cy="33900"/>
+                    </a:xfrm>
+                    <a:custGeom>
+                      <a:avLst/>
+                      <a:gdLst/>
+                      <a:ahLst/>
+                      <a:cxnLst/>
+                      <a:rect l="l" t="t" r="r" b="b"/>
+                      <a:pathLst>
+                        <a:path w="1418" h="1356" extrusionOk="0">
+                          <a:moveTo>
+                            <a:pt x="343" y="1"/>
+                          </a:moveTo>
+                          <a:cubicBezTo>
+                            <a:pt x="252" y="1"/>
+                            <a:pt x="158" y="32"/>
+                            <a:pt x="95" y="95"/>
+                          </a:cubicBezTo>
+                          <a:cubicBezTo>
+                            <a:pt x="0" y="221"/>
+                            <a:pt x="0" y="442"/>
+                            <a:pt x="95" y="568"/>
+                          </a:cubicBezTo>
+                          <a:lnTo>
+                            <a:pt x="819" y="1261"/>
+                          </a:lnTo>
+                          <a:cubicBezTo>
+                            <a:pt x="866" y="1324"/>
+                            <a:pt x="953" y="1356"/>
+                            <a:pt x="1044" y="1356"/>
+                          </a:cubicBezTo>
+                          <a:cubicBezTo>
+                            <a:pt x="1134" y="1356"/>
+                            <a:pt x="1229" y="1324"/>
+                            <a:pt x="1292" y="1261"/>
+                          </a:cubicBezTo>
+                          <a:cubicBezTo>
+                            <a:pt x="1418" y="1166"/>
+                            <a:pt x="1418" y="914"/>
+                            <a:pt x="1292" y="788"/>
+                          </a:cubicBezTo>
+                          <a:lnTo>
+                            <a:pt x="567" y="95"/>
+                          </a:lnTo>
+                          <a:cubicBezTo>
+                            <a:pt x="520" y="32"/>
+                            <a:pt x="433" y="1"/>
+                            <a:pt x="343" y="1"/>
+                          </a:cubicBezTo>
+                          <a:close/>
+                        </a:path>
+                      </a:pathLst>
+                    </a:custGeom>
+                    <a:solidFill>
+                      <a:schemeClr val="lt1"/>
+                    </a:solidFill>
+                    <a:ln>
+                      <a:noFill/>
+                    </a:ln>
+                  </p:spPr>
+                  <p:txBody>
+                    <a:bodyPr spcFirstLastPara="1" wrap="square" lIns="91425" tIns="91425" rIns="91425" bIns="91425" anchor="ctr" anchorCtr="0">
+                      <a:noAutofit/>
+                    </a:bodyPr>
+                    <a:lstStyle/>
+                    <a:p>
+                      <a:pPr marL="0" lvl="0" indent="0" algn="l" rtl="0">
+                        <a:spcBef>
+                          <a:spcPts val="0"/>
+                        </a:spcBef>
+                        <a:spcAft>
+                          <a:spcPts val="0"/>
+                        </a:spcAft>
+                        <a:buNone/>
+                      </a:pPr>
+                      <a:endParaRPr/>
+                    </a:p>
+                  </p:txBody>
+                </p:sp>
+                <p:sp>
+                  <p:nvSpPr>
+                    <p:cNvPr id="30" name="Google Shape;143;p18">
+                      <a:extLst>
+                        <a:ext uri="{FF2B5EF4-FFF2-40B4-BE49-F238E27FC236}">
+                          <a16:creationId xmlns:a16="http://schemas.microsoft.com/office/drawing/2014/main" id="{91947FFA-D7F0-9E5C-2600-9E7863416816}"/>
+                        </a:ext>
+                      </a:extLst>
+                    </p:cNvPr>
+                    <p:cNvSpPr/>
+                    <p:nvPr/>
+                  </p:nvSpPr>
+                  <p:spPr>
+                    <a:xfrm>
+                      <a:off x="5437225" y="1997650"/>
+                      <a:ext cx="37825" cy="26325"/>
+                    </a:xfrm>
+                    <a:custGeom>
+                      <a:avLst/>
+                      <a:gdLst/>
+                      <a:ahLst/>
+                      <a:cxnLst/>
+                      <a:rect l="l" t="t" r="r" b="b"/>
+                      <a:pathLst>
+                        <a:path w="1513" h="1053" extrusionOk="0">
+                          <a:moveTo>
+                            <a:pt x="422" y="0"/>
+                          </a:moveTo>
+                          <a:cubicBezTo>
+                            <a:pt x="285" y="0"/>
+                            <a:pt x="140" y="81"/>
+                            <a:pt x="95" y="196"/>
+                          </a:cubicBezTo>
+                          <a:cubicBezTo>
+                            <a:pt x="0" y="353"/>
+                            <a:pt x="95" y="574"/>
+                            <a:pt x="252" y="668"/>
+                          </a:cubicBezTo>
+                          <a:lnTo>
+                            <a:pt x="945" y="1015"/>
+                          </a:lnTo>
+                          <a:cubicBezTo>
+                            <a:pt x="989" y="1041"/>
+                            <a:pt x="1039" y="1052"/>
+                            <a:pt x="1091" y="1052"/>
+                          </a:cubicBezTo>
+                          <a:cubicBezTo>
+                            <a:pt x="1227" y="1052"/>
+                            <a:pt x="1372" y="971"/>
+                            <a:pt x="1418" y="857"/>
+                          </a:cubicBezTo>
+                          <a:cubicBezTo>
+                            <a:pt x="1512" y="700"/>
+                            <a:pt x="1418" y="479"/>
+                            <a:pt x="1260" y="385"/>
+                          </a:cubicBezTo>
+                          <a:lnTo>
+                            <a:pt x="567" y="38"/>
+                          </a:lnTo>
+                          <a:cubicBezTo>
+                            <a:pt x="524" y="12"/>
+                            <a:pt x="473" y="0"/>
+                            <a:pt x="422" y="0"/>
+                          </a:cubicBezTo>
+                          <a:close/>
+                        </a:path>
+                      </a:pathLst>
+                    </a:custGeom>
+                    <a:solidFill>
+                      <a:schemeClr val="lt1"/>
+                    </a:solidFill>
+                    <a:ln>
+                      <a:noFill/>
+                    </a:ln>
+                  </p:spPr>
+                  <p:txBody>
+                    <a:bodyPr spcFirstLastPara="1" wrap="square" lIns="91425" tIns="91425" rIns="91425" bIns="91425" anchor="ctr" anchorCtr="0">
+                      <a:noAutofit/>
+                    </a:bodyPr>
+                    <a:lstStyle/>
+                    <a:p>
+                      <a:pPr marL="0" lvl="0" indent="0" algn="l" rtl="0">
+                        <a:spcBef>
+                          <a:spcPts val="0"/>
+                        </a:spcBef>
+                        <a:spcAft>
+                          <a:spcPts val="0"/>
+                        </a:spcAft>
+                        <a:buNone/>
+                      </a:pPr>
+                      <a:endParaRPr/>
+                    </a:p>
+                  </p:txBody>
+                </p:sp>
+                <p:sp>
+                  <p:nvSpPr>
+                    <p:cNvPr id="31" name="Google Shape;144;p18">
+                      <a:extLst>
+                        <a:ext uri="{FF2B5EF4-FFF2-40B4-BE49-F238E27FC236}">
+                          <a16:creationId xmlns:a16="http://schemas.microsoft.com/office/drawing/2014/main" id="{5CD19F27-9FE6-3C0D-8C29-00F78A24ECD4}"/>
+                        </a:ext>
+                      </a:extLst>
+                    </p:cNvPr>
+                    <p:cNvSpPr/>
+                    <p:nvPr/>
+                  </p:nvSpPr>
+                  <p:spPr>
+                    <a:xfrm>
+                      <a:off x="5645150" y="1998300"/>
+                      <a:ext cx="37825" cy="26900"/>
+                    </a:xfrm>
+                    <a:custGeom>
+                      <a:avLst/>
+                      <a:gdLst/>
+                      <a:ahLst/>
+                      <a:cxnLst/>
+                      <a:rect l="l" t="t" r="r" b="b"/>
+                      <a:pathLst>
+                        <a:path w="1513" h="1076" extrusionOk="0">
+                          <a:moveTo>
+                            <a:pt x="1098" y="0"/>
+                          </a:moveTo>
+                          <a:cubicBezTo>
+                            <a:pt x="1046" y="0"/>
+                            <a:pt x="994" y="14"/>
+                            <a:pt x="946" y="44"/>
+                          </a:cubicBezTo>
+                          <a:lnTo>
+                            <a:pt x="253" y="422"/>
+                          </a:lnTo>
+                          <a:cubicBezTo>
+                            <a:pt x="95" y="485"/>
+                            <a:pt x="1" y="674"/>
+                            <a:pt x="95" y="894"/>
+                          </a:cubicBezTo>
+                          <a:cubicBezTo>
+                            <a:pt x="142" y="1011"/>
+                            <a:pt x="258" y="1076"/>
+                            <a:pt x="405" y="1076"/>
+                          </a:cubicBezTo>
+                          <a:cubicBezTo>
+                            <a:pt x="456" y="1076"/>
+                            <a:pt x="511" y="1068"/>
+                            <a:pt x="568" y="1052"/>
+                          </a:cubicBezTo>
+                          <a:lnTo>
+                            <a:pt x="1261" y="674"/>
+                          </a:lnTo>
+                          <a:cubicBezTo>
+                            <a:pt x="1418" y="611"/>
+                            <a:pt x="1513" y="422"/>
+                            <a:pt x="1418" y="201"/>
+                          </a:cubicBezTo>
+                          <a:cubicBezTo>
+                            <a:pt x="1331" y="71"/>
+                            <a:pt x="1214" y="0"/>
+                            <a:pt x="1098" y="0"/>
+                          </a:cubicBezTo>
+                          <a:close/>
+                        </a:path>
+                      </a:pathLst>
+                    </a:custGeom>
+                    <a:solidFill>
+                      <a:schemeClr val="lt1"/>
+                    </a:solidFill>
+                    <a:ln>
+                      <a:noFill/>
+                    </a:ln>
+                  </p:spPr>
+                  <p:txBody>
+                    <a:bodyPr spcFirstLastPara="1" wrap="square" lIns="91425" tIns="91425" rIns="91425" bIns="91425" anchor="ctr" anchorCtr="0">
+                      <a:noAutofit/>
+                    </a:bodyPr>
+                    <a:lstStyle/>
+                    <a:p>
+                      <a:pPr marL="0" lvl="0" indent="0" algn="l" rtl="0">
+                        <a:spcBef>
+                          <a:spcPts val="0"/>
+                        </a:spcBef>
+                        <a:spcAft>
+                          <a:spcPts val="0"/>
+                        </a:spcAft>
+                        <a:buNone/>
+                      </a:pPr>
+                      <a:endParaRPr/>
+                    </a:p>
+                  </p:txBody>
+                </p:sp>
+              </p:grpSp>
+            </p:grpSp>
+          </p:grpSp>
+          <p:grpSp>
+            <p:nvGrpSpPr>
+              <p:cNvPr id="11" name="Google Shape;145;p18">
+                <a:extLst>
+                  <a:ext uri="{FF2B5EF4-FFF2-40B4-BE49-F238E27FC236}">
+                    <a16:creationId xmlns:a16="http://schemas.microsoft.com/office/drawing/2014/main" id="{61BD4453-F1E0-7905-32C4-1EAFE4C97B06}"/>
+                  </a:ext>
+                </a:extLst>
+              </p:cNvPr>
+              <p:cNvGrpSpPr/>
+              <p:nvPr/>
+            </p:nvGrpSpPr>
+            <p:grpSpPr>
+              <a:xfrm>
+                <a:off x="4047659" y="3426859"/>
+                <a:ext cx="511630" cy="509783"/>
+                <a:chOff x="4216488" y="3426859"/>
+                <a:chExt cx="511630" cy="509783"/>
+              </a:xfrm>
+            </p:grpSpPr>
+            <p:sp>
+              <p:nvSpPr>
+                <p:cNvPr id="12" name="Google Shape;146;p18">
+                  <a:extLst>
+                    <a:ext uri="{FF2B5EF4-FFF2-40B4-BE49-F238E27FC236}">
+                      <a16:creationId xmlns:a16="http://schemas.microsoft.com/office/drawing/2014/main" id="{901A5652-D531-87D3-DDF2-62A0F9BAD4B0}"/>
+                    </a:ext>
+                  </a:extLst>
+                </p:cNvPr>
+                <p:cNvSpPr/>
+                <p:nvPr/>
+              </p:nvSpPr>
+              <p:spPr>
+                <a:xfrm>
+                  <a:off x="4216488" y="3426859"/>
+                  <a:ext cx="511630" cy="509783"/>
+                </a:xfrm>
+                <a:custGeom>
+                  <a:avLst/>
+                  <a:gdLst/>
+                  <a:ahLst/>
+                  <a:cxnLst/>
+                  <a:rect l="l" t="t" r="r" b="b"/>
+                  <a:pathLst>
+                    <a:path w="6095" h="6073" extrusionOk="0">
+                      <a:moveTo>
+                        <a:pt x="3059" y="1"/>
+                      </a:moveTo>
+                      <a:cubicBezTo>
+                        <a:pt x="1347" y="1"/>
+                        <a:pt x="1" y="1324"/>
+                        <a:pt x="1" y="3036"/>
+                      </a:cubicBezTo>
+                      <a:cubicBezTo>
+                        <a:pt x="1" y="4748"/>
+                        <a:pt x="1347" y="6072"/>
+                        <a:pt x="3059" y="6072"/>
+                      </a:cubicBezTo>
+                      <a:cubicBezTo>
+                        <a:pt x="4771" y="6072"/>
+                        <a:pt x="6095" y="4748"/>
+                        <a:pt x="6095" y="3036"/>
+                      </a:cubicBezTo>
+                      <a:cubicBezTo>
+                        <a:pt x="6095" y="1324"/>
+                        <a:pt x="4771" y="1"/>
+                        <a:pt x="3059" y="1"/>
+                      </a:cubicBezTo>
+                      <a:close/>
+                    </a:path>
+                  </a:pathLst>
+                </a:custGeom>
+                <a:solidFill>
+                  <a:schemeClr val="accent6"/>
+                </a:solidFill>
+                <a:ln>
+                  <a:noFill/>
+                </a:ln>
+              </p:spPr>
+              <p:txBody>
+                <a:bodyPr spcFirstLastPara="1" wrap="square" lIns="91425" tIns="91425" rIns="91425" bIns="91425" anchor="ctr" anchorCtr="0">
+                  <a:noAutofit/>
+                </a:bodyPr>
+                <a:lstStyle/>
+                <a:p>
+                  <a:pPr marL="0" lvl="0" indent="0" algn="l" rtl="0">
+                    <a:spcBef>
+                      <a:spcPts val="0"/>
+                    </a:spcBef>
+                    <a:spcAft>
+                      <a:spcPts val="0"/>
+                    </a:spcAft>
+                    <a:buNone/>
+                  </a:pPr>
+                  <a:endParaRPr/>
+                </a:p>
+              </p:txBody>
+            </p:sp>
+            <p:grpSp>
+              <p:nvGrpSpPr>
+                <p:cNvPr id="13" name="Google Shape;147;p18">
+                  <a:extLst>
+                    <a:ext uri="{FF2B5EF4-FFF2-40B4-BE49-F238E27FC236}">
+                      <a16:creationId xmlns:a16="http://schemas.microsoft.com/office/drawing/2014/main" id="{87D7ABE1-5934-03F8-255C-CD912CBC8DCF}"/>
+                    </a:ext>
+                  </a:extLst>
+                </p:cNvPr>
+                <p:cNvGrpSpPr/>
+                <p:nvPr/>
+              </p:nvGrpSpPr>
+              <p:grpSpPr>
+                <a:xfrm>
+                  <a:off x="4296660" y="3506107"/>
+                  <a:ext cx="351286" cy="351286"/>
+                  <a:chOff x="1049375" y="2680675"/>
+                  <a:chExt cx="297725" cy="297725"/>
+                </a:xfrm>
+              </p:grpSpPr>
+              <p:sp>
+                <p:nvSpPr>
+                  <p:cNvPr id="14" name="Google Shape;148;p18">
+                    <a:extLst>
+                      <a:ext uri="{FF2B5EF4-FFF2-40B4-BE49-F238E27FC236}">
+                        <a16:creationId xmlns:a16="http://schemas.microsoft.com/office/drawing/2014/main" id="{A8CF8AD0-282D-65E7-59E2-0A3C938DE78F}"/>
+                      </a:ext>
+                    </a:extLst>
+                  </p:cNvPr>
+                  <p:cNvSpPr/>
+                  <p:nvPr/>
+                </p:nvSpPr>
+                <p:spPr>
+                  <a:xfrm>
+                    <a:off x="1113175" y="2752350"/>
+                    <a:ext cx="161475" cy="155975"/>
+                  </a:xfrm>
+                  <a:custGeom>
+                    <a:avLst/>
+                    <a:gdLst/>
+                    <a:ahLst/>
+                    <a:cxnLst/>
+                    <a:rect l="l" t="t" r="r" b="b"/>
+                    <a:pathLst>
+                      <a:path w="6459" h="6239" extrusionOk="0">
+                        <a:moveTo>
+                          <a:pt x="3403" y="2079"/>
+                        </a:moveTo>
+                        <a:cubicBezTo>
+                          <a:pt x="3781" y="2079"/>
+                          <a:pt x="4096" y="2394"/>
+                          <a:pt x="4096" y="2773"/>
+                        </a:cubicBezTo>
+                        <a:cubicBezTo>
+                          <a:pt x="4096" y="3182"/>
+                          <a:pt x="3781" y="3497"/>
+                          <a:pt x="3403" y="3497"/>
+                        </a:cubicBezTo>
+                        <a:cubicBezTo>
+                          <a:pt x="2993" y="3434"/>
+                          <a:pt x="2678" y="3119"/>
+                          <a:pt x="2678" y="2773"/>
+                        </a:cubicBezTo>
+                        <a:cubicBezTo>
+                          <a:pt x="2678" y="2394"/>
+                          <a:pt x="2993" y="2079"/>
+                          <a:pt x="3403" y="2079"/>
+                        </a:cubicBezTo>
+                        <a:close/>
+                        <a:moveTo>
+                          <a:pt x="3371" y="693"/>
+                        </a:moveTo>
+                        <a:cubicBezTo>
+                          <a:pt x="4694" y="693"/>
+                          <a:pt x="5765" y="1796"/>
+                          <a:pt x="5765" y="3119"/>
+                        </a:cubicBezTo>
+                        <a:cubicBezTo>
+                          <a:pt x="5765" y="3686"/>
+                          <a:pt x="5545" y="4222"/>
+                          <a:pt x="5198" y="4663"/>
+                        </a:cubicBezTo>
+                        <a:cubicBezTo>
+                          <a:pt x="5072" y="4442"/>
+                          <a:pt x="4915" y="4190"/>
+                          <a:pt x="4694" y="4001"/>
+                        </a:cubicBezTo>
+                        <a:cubicBezTo>
+                          <a:pt x="4568" y="3907"/>
+                          <a:pt x="4442" y="3812"/>
+                          <a:pt x="4348" y="3749"/>
+                        </a:cubicBezTo>
+                        <a:cubicBezTo>
+                          <a:pt x="4568" y="3529"/>
+                          <a:pt x="4726" y="3182"/>
+                          <a:pt x="4726" y="2804"/>
+                        </a:cubicBezTo>
+                        <a:cubicBezTo>
+                          <a:pt x="4726" y="2079"/>
+                          <a:pt x="4096" y="1449"/>
+                          <a:pt x="3340" y="1449"/>
+                        </a:cubicBezTo>
+                        <a:cubicBezTo>
+                          <a:pt x="2615" y="1449"/>
+                          <a:pt x="1985" y="2079"/>
+                          <a:pt x="1985" y="2804"/>
+                        </a:cubicBezTo>
+                        <a:cubicBezTo>
+                          <a:pt x="1985" y="3182"/>
+                          <a:pt x="2142" y="3529"/>
+                          <a:pt x="2363" y="3749"/>
+                        </a:cubicBezTo>
+                        <a:lnTo>
+                          <a:pt x="2016" y="4001"/>
+                        </a:lnTo>
+                        <a:cubicBezTo>
+                          <a:pt x="1827" y="4190"/>
+                          <a:pt x="1607" y="4442"/>
+                          <a:pt x="1512" y="4663"/>
+                        </a:cubicBezTo>
+                        <a:cubicBezTo>
+                          <a:pt x="1040" y="4064"/>
+                          <a:pt x="882" y="3434"/>
+                          <a:pt x="945" y="2773"/>
+                        </a:cubicBezTo>
+                        <a:cubicBezTo>
+                          <a:pt x="1103" y="1670"/>
+                          <a:pt x="2111" y="693"/>
+                          <a:pt x="3371" y="693"/>
+                        </a:cubicBezTo>
+                        <a:close/>
+                        <a:moveTo>
+                          <a:pt x="3371" y="4159"/>
+                        </a:moveTo>
+                        <a:cubicBezTo>
+                          <a:pt x="4001" y="4159"/>
+                          <a:pt x="4505" y="4600"/>
+                          <a:pt x="4694" y="5135"/>
+                        </a:cubicBezTo>
+                        <a:cubicBezTo>
+                          <a:pt x="4316" y="5387"/>
+                          <a:pt x="3875" y="5545"/>
+                          <a:pt x="3371" y="5545"/>
+                        </a:cubicBezTo>
+                        <a:cubicBezTo>
+                          <a:pt x="2898" y="5545"/>
+                          <a:pt x="2426" y="5387"/>
+                          <a:pt x="2016" y="5135"/>
+                        </a:cubicBezTo>
+                        <a:cubicBezTo>
+                          <a:pt x="2174" y="4537"/>
+                          <a:pt x="2741" y="4159"/>
+                          <a:pt x="3371" y="4159"/>
+                        </a:cubicBezTo>
+                        <a:close/>
+                        <a:moveTo>
+                          <a:pt x="3308" y="0"/>
+                        </a:moveTo>
+                        <a:cubicBezTo>
+                          <a:pt x="1701" y="0"/>
+                          <a:pt x="441" y="1229"/>
+                          <a:pt x="252" y="2710"/>
+                        </a:cubicBezTo>
+                        <a:cubicBezTo>
+                          <a:pt x="0" y="4600"/>
+                          <a:pt x="1512" y="6238"/>
+                          <a:pt x="3371" y="6238"/>
+                        </a:cubicBezTo>
+                        <a:cubicBezTo>
+                          <a:pt x="5104" y="6238"/>
+                          <a:pt x="6459" y="4820"/>
+                          <a:pt x="6459" y="3119"/>
+                        </a:cubicBezTo>
+                        <a:cubicBezTo>
+                          <a:pt x="6459" y="1386"/>
+                          <a:pt x="5041" y="0"/>
+                          <a:pt x="3308" y="0"/>
+                        </a:cubicBezTo>
+                        <a:close/>
+                      </a:path>
+                    </a:pathLst>
+                  </a:custGeom>
+                  <a:solidFill>
+                    <a:schemeClr val="lt1"/>
+                  </a:solidFill>
+                  <a:ln>
+                    <a:noFill/>
+                  </a:ln>
+                </p:spPr>
+                <p:txBody>
+                  <a:bodyPr spcFirstLastPara="1" wrap="square" lIns="91425" tIns="91425" rIns="91425" bIns="91425" anchor="ctr" anchorCtr="0">
+                    <a:noAutofit/>
+                  </a:bodyPr>
+                  <a:lstStyle/>
+                  <a:p>
+                    <a:pPr marL="0" lvl="0" indent="0" algn="l" rtl="0">
+                      <a:spcBef>
+                        <a:spcPts val="0"/>
+                      </a:spcBef>
+                      <a:spcAft>
+                        <a:spcPts val="0"/>
+                      </a:spcAft>
+                      <a:buNone/>
+                    </a:pPr>
+                    <a:endParaRPr/>
+                  </a:p>
+                </p:txBody>
+              </p:sp>
+              <p:sp>
+                <p:nvSpPr>
+                  <p:cNvPr id="15" name="Google Shape;149;p18">
+                    <a:extLst>
+                      <a:ext uri="{FF2B5EF4-FFF2-40B4-BE49-F238E27FC236}">
+                        <a16:creationId xmlns:a16="http://schemas.microsoft.com/office/drawing/2014/main" id="{807FA481-7ACE-DEC3-5702-3D17F2EB1456}"/>
+                      </a:ext>
+                    </a:extLst>
+                  </p:cNvPr>
+                  <p:cNvSpPr/>
+                  <p:nvPr/>
+                </p:nvSpPr>
+                <p:spPr>
+                  <a:xfrm>
+                    <a:off x="1049375" y="2680675"/>
+                    <a:ext cx="297725" cy="297725"/>
+                  </a:xfrm>
+                  <a:custGeom>
+                    <a:avLst/>
+                    <a:gdLst/>
+                    <a:ahLst/>
+                    <a:cxnLst/>
+                    <a:rect l="l" t="t" r="r" b="b"/>
+                    <a:pathLst>
+                      <a:path w="11909" h="11909" extrusionOk="0">
+                        <a:moveTo>
+                          <a:pt x="6270" y="1512"/>
+                        </a:moveTo>
+                        <a:cubicBezTo>
+                          <a:pt x="8475" y="1670"/>
+                          <a:pt x="10239" y="3434"/>
+                          <a:pt x="10397" y="5640"/>
+                        </a:cubicBezTo>
+                        <a:lnTo>
+                          <a:pt x="10082" y="5640"/>
+                        </a:lnTo>
+                        <a:cubicBezTo>
+                          <a:pt x="9893" y="5640"/>
+                          <a:pt x="9735" y="5797"/>
+                          <a:pt x="9735" y="5986"/>
+                        </a:cubicBezTo>
+                        <a:cubicBezTo>
+                          <a:pt x="9735" y="6207"/>
+                          <a:pt x="9893" y="6364"/>
+                          <a:pt x="10082" y="6364"/>
+                        </a:cubicBezTo>
+                        <a:lnTo>
+                          <a:pt x="10397" y="6364"/>
+                        </a:lnTo>
+                        <a:cubicBezTo>
+                          <a:pt x="10239" y="8569"/>
+                          <a:pt x="8475" y="10334"/>
+                          <a:pt x="6270" y="10491"/>
+                        </a:cubicBezTo>
+                        <a:lnTo>
+                          <a:pt x="6270" y="10176"/>
+                        </a:lnTo>
+                        <a:cubicBezTo>
+                          <a:pt x="6270" y="9987"/>
+                          <a:pt x="6112" y="9830"/>
+                          <a:pt x="5923" y="9830"/>
+                        </a:cubicBezTo>
+                        <a:cubicBezTo>
+                          <a:pt x="5703" y="9830"/>
+                          <a:pt x="5545" y="9987"/>
+                          <a:pt x="5545" y="10176"/>
+                        </a:cubicBezTo>
+                        <a:lnTo>
+                          <a:pt x="5545" y="10491"/>
+                        </a:lnTo>
+                        <a:cubicBezTo>
+                          <a:pt x="3340" y="10334"/>
+                          <a:pt x="1575" y="8569"/>
+                          <a:pt x="1418" y="6364"/>
+                        </a:cubicBezTo>
+                        <a:lnTo>
+                          <a:pt x="1733" y="6364"/>
+                        </a:lnTo>
+                        <a:cubicBezTo>
+                          <a:pt x="1922" y="6364"/>
+                          <a:pt x="2079" y="6207"/>
+                          <a:pt x="2079" y="5986"/>
+                        </a:cubicBezTo>
+                        <a:cubicBezTo>
+                          <a:pt x="2142" y="5797"/>
+                          <a:pt x="1985" y="5640"/>
+                          <a:pt x="1764" y="5640"/>
+                        </a:cubicBezTo>
+                        <a:lnTo>
+                          <a:pt x="1418" y="5640"/>
+                        </a:lnTo>
+                        <a:cubicBezTo>
+                          <a:pt x="1575" y="3434"/>
+                          <a:pt x="3340" y="1670"/>
+                          <a:pt x="5545" y="1512"/>
+                        </a:cubicBezTo>
+                        <a:lnTo>
+                          <a:pt x="5545" y="1827"/>
+                        </a:lnTo>
+                        <a:cubicBezTo>
+                          <a:pt x="5545" y="2016"/>
+                          <a:pt x="5703" y="2174"/>
+                          <a:pt x="5923" y="2174"/>
+                        </a:cubicBezTo>
+                        <a:cubicBezTo>
+                          <a:pt x="6112" y="2174"/>
+                          <a:pt x="6270" y="2016"/>
+                          <a:pt x="6270" y="1827"/>
+                        </a:cubicBezTo>
+                        <a:lnTo>
+                          <a:pt x="6270" y="1512"/>
+                        </a:lnTo>
+                        <a:close/>
+                        <a:moveTo>
+                          <a:pt x="5955" y="0"/>
+                        </a:moveTo>
+                        <a:cubicBezTo>
+                          <a:pt x="5766" y="0"/>
+                          <a:pt x="5608" y="158"/>
+                          <a:pt x="5608" y="347"/>
+                        </a:cubicBezTo>
+                        <a:lnTo>
+                          <a:pt x="5608" y="756"/>
+                        </a:lnTo>
+                        <a:cubicBezTo>
+                          <a:pt x="2993" y="914"/>
+                          <a:pt x="914" y="2993"/>
+                          <a:pt x="756" y="5608"/>
+                        </a:cubicBezTo>
+                        <a:lnTo>
+                          <a:pt x="347" y="5608"/>
+                        </a:lnTo>
+                        <a:cubicBezTo>
+                          <a:pt x="158" y="5608"/>
+                          <a:pt x="0" y="5766"/>
+                          <a:pt x="0" y="5955"/>
+                        </a:cubicBezTo>
+                        <a:cubicBezTo>
+                          <a:pt x="0" y="6144"/>
+                          <a:pt x="158" y="6301"/>
+                          <a:pt x="347" y="6301"/>
+                        </a:cubicBezTo>
+                        <a:lnTo>
+                          <a:pt x="756" y="6301"/>
+                        </a:lnTo>
+                        <a:cubicBezTo>
+                          <a:pt x="914" y="8916"/>
+                          <a:pt x="2993" y="10995"/>
+                          <a:pt x="5608" y="11153"/>
+                        </a:cubicBezTo>
+                        <a:lnTo>
+                          <a:pt x="5608" y="11562"/>
+                        </a:lnTo>
+                        <a:cubicBezTo>
+                          <a:pt x="5608" y="11751"/>
+                          <a:pt x="5766" y="11909"/>
+                          <a:pt x="5955" y="11909"/>
+                        </a:cubicBezTo>
+                        <a:cubicBezTo>
+                          <a:pt x="6144" y="11909"/>
+                          <a:pt x="6301" y="11751"/>
+                          <a:pt x="6301" y="11562"/>
+                        </a:cubicBezTo>
+                        <a:lnTo>
+                          <a:pt x="6301" y="11153"/>
+                        </a:lnTo>
+                        <a:cubicBezTo>
+                          <a:pt x="8916" y="10995"/>
+                          <a:pt x="10995" y="8916"/>
+                          <a:pt x="11153" y="6301"/>
+                        </a:cubicBezTo>
+                        <a:lnTo>
+                          <a:pt x="11531" y="6301"/>
+                        </a:lnTo>
+                        <a:cubicBezTo>
+                          <a:pt x="11751" y="6301"/>
+                          <a:pt x="11909" y="6144"/>
+                          <a:pt x="11909" y="5955"/>
+                        </a:cubicBezTo>
+                        <a:cubicBezTo>
+                          <a:pt x="11909" y="5766"/>
+                          <a:pt x="11751" y="5608"/>
+                          <a:pt x="11531" y="5608"/>
+                        </a:cubicBezTo>
+                        <a:lnTo>
+                          <a:pt x="11153" y="5608"/>
+                        </a:lnTo>
+                        <a:cubicBezTo>
+                          <a:pt x="10995" y="2993"/>
+                          <a:pt x="8916" y="914"/>
+                          <a:pt x="6301" y="756"/>
+                        </a:cubicBezTo>
+                        <a:lnTo>
+                          <a:pt x="6301" y="347"/>
+                        </a:lnTo>
+                        <a:cubicBezTo>
+                          <a:pt x="6301" y="158"/>
+                          <a:pt x="6144" y="0"/>
+                          <a:pt x="5955" y="0"/>
+                        </a:cubicBezTo>
+                        <a:close/>
+                      </a:path>
+                    </a:pathLst>
+                  </a:custGeom>
+                  <a:solidFill>
+                    <a:schemeClr val="lt1"/>
+                  </a:solidFill>
+                  <a:ln>
+                    <a:noFill/>
+                  </a:ln>
+                </p:spPr>
+                <p:txBody>
+                  <a:bodyPr spcFirstLastPara="1" wrap="square" lIns="91425" tIns="91425" rIns="91425" bIns="91425" anchor="ctr" anchorCtr="0">
+                    <a:noAutofit/>
+                  </a:bodyPr>
+                  <a:lstStyle/>
+                  <a:p>
+                    <a:pPr marL="0" lvl="0" indent="0" algn="l" rtl="0">
+                      <a:spcBef>
+                        <a:spcPts val="0"/>
+                      </a:spcBef>
+                      <a:spcAft>
+                        <a:spcPts val="0"/>
+                      </a:spcAft>
+                      <a:buNone/>
+                    </a:pPr>
+                    <a:endParaRPr/>
+                  </a:p>
+                </p:txBody>
+              </p:sp>
+            </p:grpSp>
+          </p:grpSp>
+        </p:grpSp>
+      </p:grpSp>
+    </p:spTree>
+    <p:extLst>
+      <p:ext uri="{BB962C8B-B14F-4D97-AF65-F5344CB8AC3E}">
+        <p14:creationId xmlns:p14="http://schemas.microsoft.com/office/powerpoint/2010/main" val="2211117673"/>
       </p:ext>
     </p:extLst>
   </p:cSld>
@@ -8732,7 +12263,7 @@
           </p:cNvPicPr>
           <p:nvPr/>
         </p:nvPicPr>
-        <p:blipFill>
+        <p:blipFill rotWithShape="1">
           <a:blip r:embed="rId3">
             <a:extLst>
               <a:ext uri="{28A0092B-C50C-407E-A947-70E740481C1C}">
@@ -8740,15 +12271,13 @@
               </a:ext>
             </a:extLst>
           </a:blip>
-          <a:srcRect/>
-          <a:stretch>
-            <a:fillRect/>
-          </a:stretch>
+          <a:srcRect l="-1315" t="-448" r="-912" b="-3357"/>
+          <a:stretch/>
         </p:blipFill>
         <p:spPr bwMode="auto">
           <a:xfrm>
-            <a:off x="433388" y="276225"/>
-            <a:ext cx="11325225" cy="6305550"/>
+            <a:off x="284137" y="247973"/>
+            <a:ext cx="11577232" cy="6545451"/>
           </a:xfrm>
           <a:prstGeom prst="rect">
             <a:avLst/>
@@ -8769,6 +12298,626 @@
     <p:extLst>
       <p:ext uri="{BB962C8B-B14F-4D97-AF65-F5344CB8AC3E}">
         <p14:creationId xmlns:p14="http://schemas.microsoft.com/office/powerpoint/2010/main" val="3383484192"/>
+      </p:ext>
+    </p:extLst>
+  </p:cSld>
+  <p:clrMapOvr>
+    <a:masterClrMapping/>
+  </p:clrMapOvr>
+</p:sld>
+</file>
+
+<file path=ppt/slides/slide8.xml><?xml version="1.0" encoding="utf-8"?>
+<p:sld xmlns:a="http://schemas.openxmlformats.org/drawingml/2006/main" xmlns:r="http://schemas.openxmlformats.org/officeDocument/2006/relationships" xmlns:p="http://schemas.openxmlformats.org/presentationml/2006/main">
+  <p:cSld>
+    <p:spTree>
+      <p:nvGrpSpPr>
+        <p:cNvPr id="1" name=""/>
+        <p:cNvGrpSpPr/>
+        <p:nvPr/>
+      </p:nvGrpSpPr>
+      <p:grpSpPr>
+        <a:xfrm>
+          <a:off x="0" y="0"/>
+          <a:ext cx="0" cy="0"/>
+          <a:chOff x="0" y="0"/>
+          <a:chExt cx="0" cy="0"/>
+        </a:xfrm>
+      </p:grpSpPr>
+      <p:pic>
+        <p:nvPicPr>
+          <p:cNvPr id="2" name="Picture 2" descr="A diagram of software development&#10;&#10;Description automatically generated">
+            <a:extLst>
+              <a:ext uri="{FF2B5EF4-FFF2-40B4-BE49-F238E27FC236}">
+                <a16:creationId xmlns:a16="http://schemas.microsoft.com/office/drawing/2014/main" id="{1A023A1E-FE35-0924-5AE2-7AE5FF22CDEC}"/>
+              </a:ext>
+            </a:extLst>
+          </p:cNvPr>
+          <p:cNvPicPr>
+            <a:picLocks noChangeAspect="1" noChangeArrowheads="1"/>
+          </p:cNvPicPr>
+          <p:nvPr/>
+        </p:nvPicPr>
+        <p:blipFill rotWithShape="1">
+          <a:blip r:embed="rId2">
+            <a:extLst>
+              <a:ext uri="{28A0092B-C50C-407E-A947-70E740481C1C}">
+                <a14:useLocalDpi xmlns:a14="http://schemas.microsoft.com/office/drawing/2010/main" val="0"/>
+              </a:ext>
+            </a:extLst>
+          </a:blip>
+          <a:srcRect l="78469" t="41827" r="10595" b="28268"/>
+          <a:stretch/>
+        </p:blipFill>
+        <p:spPr bwMode="auto">
+          <a:xfrm>
+            <a:off x="9319649" y="2913681"/>
+            <a:ext cx="1238481" cy="1885627"/>
+          </a:xfrm>
+          <a:prstGeom prst="rect">
+            <a:avLst/>
+          </a:prstGeom>
+          <a:noFill/>
+          <a:extLst>
+            <a:ext uri="{909E8E84-426E-40DD-AFC4-6F175D3DCCD1}">
+              <a14:hiddenFill xmlns:a14="http://schemas.microsoft.com/office/drawing/2010/main">
+                <a:solidFill>
+                  <a:srgbClr val="FFFFFF"/>
+                </a:solidFill>
+              </a14:hiddenFill>
+            </a:ext>
+          </a:extLst>
+        </p:spPr>
+      </p:pic>
+    </p:spTree>
+    <p:extLst>
+      <p:ext uri="{BB962C8B-B14F-4D97-AF65-F5344CB8AC3E}">
+        <p14:creationId xmlns:p14="http://schemas.microsoft.com/office/powerpoint/2010/main" val="1769177124"/>
+      </p:ext>
+    </p:extLst>
+  </p:cSld>
+  <p:clrMapOvr>
+    <a:masterClrMapping/>
+  </p:clrMapOvr>
+</p:sld>
+</file>
+
+<file path=ppt/slides/slide9.xml><?xml version="1.0" encoding="utf-8"?>
+<p:sld xmlns:a="http://schemas.openxmlformats.org/drawingml/2006/main" xmlns:r="http://schemas.openxmlformats.org/officeDocument/2006/relationships" xmlns:p="http://schemas.openxmlformats.org/presentationml/2006/main">
+  <p:cSld>
+    <p:spTree>
+      <p:nvGrpSpPr>
+        <p:cNvPr id="1" name=""/>
+        <p:cNvGrpSpPr/>
+        <p:nvPr/>
+      </p:nvGrpSpPr>
+      <p:grpSpPr>
+        <a:xfrm>
+          <a:off x="0" y="0"/>
+          <a:ext cx="0" cy="0"/>
+          <a:chOff x="0" y="0"/>
+          <a:chExt cx="0" cy="0"/>
+        </a:xfrm>
+      </p:grpSpPr>
+      <p:grpSp>
+        <p:nvGrpSpPr>
+          <p:cNvPr id="11" name="Group 10">
+            <a:extLst>
+              <a:ext uri="{FF2B5EF4-FFF2-40B4-BE49-F238E27FC236}">
+                <a16:creationId xmlns:a16="http://schemas.microsoft.com/office/drawing/2014/main" id="{5C63A937-4628-C247-62C0-DC974A44844F}"/>
+              </a:ext>
+            </a:extLst>
+          </p:cNvPr>
+          <p:cNvGrpSpPr/>
+          <p:nvPr/>
+        </p:nvGrpSpPr>
+        <p:grpSpPr>
+          <a:xfrm>
+            <a:off x="593538" y="2276457"/>
+            <a:ext cx="9788945" cy="4260113"/>
+            <a:chOff x="593538" y="2276457"/>
+            <a:chExt cx="9788945" cy="4260113"/>
+          </a:xfrm>
+        </p:grpSpPr>
+        <p:pic>
+          <p:nvPicPr>
+            <p:cNvPr id="2" name="Picture 2" descr="A diagram of software development&#10;&#10;Description automatically generated">
+              <a:extLst>
+                <a:ext uri="{FF2B5EF4-FFF2-40B4-BE49-F238E27FC236}">
+                  <a16:creationId xmlns:a16="http://schemas.microsoft.com/office/drawing/2014/main" id="{1418CBCC-0FE1-C37D-4A41-E85013E1E0C6}"/>
+                </a:ext>
+              </a:extLst>
+            </p:cNvPr>
+            <p:cNvPicPr>
+              <a:picLocks noChangeAspect="1" noChangeArrowheads="1"/>
+            </p:cNvPicPr>
+            <p:nvPr/>
+          </p:nvPicPr>
+          <p:blipFill rotWithShape="1">
+            <a:blip r:embed="rId2">
+              <a:extLst>
+                <a:ext uri="{28A0092B-C50C-407E-A947-70E740481C1C}">
+                  <a14:useLocalDpi xmlns:a14="http://schemas.microsoft.com/office/drawing/2010/main" val="0"/>
+                </a:ext>
+              </a:extLst>
+            </a:blip>
+            <a:srcRect t="36891" r="83984"/>
+            <a:stretch/>
+          </p:blipFill>
+          <p:spPr bwMode="auto">
+            <a:xfrm>
+              <a:off x="593538" y="2557219"/>
+              <a:ext cx="1813866" cy="3979351"/>
+            </a:xfrm>
+            <a:prstGeom prst="rect">
+              <a:avLst/>
+            </a:prstGeom>
+            <a:noFill/>
+            <a:extLst>
+              <a:ext uri="{909E8E84-426E-40DD-AFC4-6F175D3DCCD1}">
+                <a14:hiddenFill xmlns:a14="http://schemas.microsoft.com/office/drawing/2010/main">
+                  <a:solidFill>
+                    <a:srgbClr val="FFFFFF"/>
+                  </a:solidFill>
+                </a14:hiddenFill>
+              </a:ext>
+            </a:extLst>
+          </p:spPr>
+        </p:pic>
+        <p:pic>
+          <p:nvPicPr>
+            <p:cNvPr id="3" name="Picture 2" descr="A diagram of software development&#10;&#10;Description automatically generated">
+              <a:extLst>
+                <a:ext uri="{FF2B5EF4-FFF2-40B4-BE49-F238E27FC236}">
+                  <a16:creationId xmlns:a16="http://schemas.microsoft.com/office/drawing/2014/main" id="{EDF505B4-8686-918F-920D-CB228CB7C57B}"/>
+                </a:ext>
+              </a:extLst>
+            </p:cNvPr>
+            <p:cNvPicPr>
+              <a:picLocks noChangeAspect="1" noChangeArrowheads="1"/>
+            </p:cNvPicPr>
+            <p:nvPr/>
+          </p:nvPicPr>
+          <p:blipFill rotWithShape="1">
+            <a:blip r:embed="rId2">
+              <a:extLst>
+                <a:ext uri="{28A0092B-C50C-407E-A947-70E740481C1C}">
+                  <a14:useLocalDpi xmlns:a14="http://schemas.microsoft.com/office/drawing/2010/main" val="0"/>
+                </a:ext>
+              </a:extLst>
+            </a:blip>
+            <a:srcRect l="34080" t="45105" r="56021" b="20485"/>
+            <a:stretch/>
+          </p:blipFill>
+          <p:spPr bwMode="auto">
+            <a:xfrm>
+              <a:off x="3347634" y="3383796"/>
+              <a:ext cx="1121044" cy="2169763"/>
+            </a:xfrm>
+            <a:prstGeom prst="rect">
+              <a:avLst/>
+            </a:prstGeom>
+            <a:noFill/>
+            <a:extLst>
+              <a:ext uri="{909E8E84-426E-40DD-AFC4-6F175D3DCCD1}">
+                <a14:hiddenFill xmlns:a14="http://schemas.microsoft.com/office/drawing/2010/main">
+                  <a:solidFill>
+                    <a:srgbClr val="FFFFFF"/>
+                  </a:solidFill>
+                </a14:hiddenFill>
+              </a:ext>
+            </a:extLst>
+          </p:spPr>
+        </p:pic>
+        <p:pic>
+          <p:nvPicPr>
+            <p:cNvPr id="4" name="Picture 2" descr="A diagram of software development&#10;&#10;Description automatically generated">
+              <a:extLst>
+                <a:ext uri="{FF2B5EF4-FFF2-40B4-BE49-F238E27FC236}">
+                  <a16:creationId xmlns:a16="http://schemas.microsoft.com/office/drawing/2014/main" id="{636BB3DF-8880-D07A-50AE-EB698DE95055}"/>
+                </a:ext>
+              </a:extLst>
+            </p:cNvPr>
+            <p:cNvPicPr>
+              <a:picLocks noChangeAspect="1" noChangeArrowheads="1"/>
+            </p:cNvPicPr>
+            <p:nvPr/>
+          </p:nvPicPr>
+          <p:blipFill rotWithShape="1">
+            <a:blip r:embed="rId2">
+              <a:extLst>
+                <a:ext uri="{28A0092B-C50C-407E-A947-70E740481C1C}">
+                  <a14:useLocalDpi xmlns:a14="http://schemas.microsoft.com/office/drawing/2010/main" val="0"/>
+                </a:ext>
+              </a:extLst>
+            </a:blip>
+            <a:srcRect l="78469" t="41827" r="10595" b="28268"/>
+            <a:stretch/>
+          </p:blipFill>
+          <p:spPr bwMode="auto">
+            <a:xfrm>
+              <a:off x="9144002" y="3429000"/>
+              <a:ext cx="1238481" cy="1885627"/>
+            </a:xfrm>
+            <a:prstGeom prst="rect">
+              <a:avLst/>
+            </a:prstGeom>
+            <a:noFill/>
+            <a:extLst>
+              <a:ext uri="{909E8E84-426E-40DD-AFC4-6F175D3DCCD1}">
+                <a14:hiddenFill xmlns:a14="http://schemas.microsoft.com/office/drawing/2010/main">
+                  <a:solidFill>
+                    <a:srgbClr val="FFFFFF"/>
+                  </a:solidFill>
+                </a14:hiddenFill>
+              </a:ext>
+            </a:extLst>
+          </p:spPr>
+        </p:pic>
+        <p:sp>
+          <p:nvSpPr>
+            <p:cNvPr id="6" name="Google Shape;128;p18">
+              <a:extLst>
+                <a:ext uri="{FF2B5EF4-FFF2-40B4-BE49-F238E27FC236}">
+                  <a16:creationId xmlns:a16="http://schemas.microsoft.com/office/drawing/2014/main" id="{D994E3C8-7F24-96EB-DB1D-8DF25854F32C}"/>
+                </a:ext>
+              </a:extLst>
+            </p:cNvPr>
+            <p:cNvSpPr/>
+            <p:nvPr/>
+          </p:nvSpPr>
+          <p:spPr>
+            <a:xfrm>
+              <a:off x="4893158" y="2276457"/>
+              <a:ext cx="2568473" cy="2527860"/>
+            </a:xfrm>
+            <a:custGeom>
+              <a:avLst/>
+              <a:gdLst/>
+              <a:ahLst/>
+              <a:cxnLst/>
+              <a:rect l="l" t="t" r="r" b="b"/>
+              <a:pathLst>
+                <a:path w="24538" h="24150" extrusionOk="0">
+                  <a:moveTo>
+                    <a:pt x="12463" y="1"/>
+                  </a:moveTo>
+                  <a:cubicBezTo>
+                    <a:pt x="5821" y="1"/>
+                    <a:pt x="388" y="5410"/>
+                    <a:pt x="388" y="12075"/>
+                  </a:cubicBezTo>
+                  <a:cubicBezTo>
+                    <a:pt x="388" y="13787"/>
+                    <a:pt x="776" y="15408"/>
+                    <a:pt x="1347" y="16914"/>
+                  </a:cubicBezTo>
+                  <a:lnTo>
+                    <a:pt x="0" y="18261"/>
+                  </a:lnTo>
+                  <a:lnTo>
+                    <a:pt x="4953" y="17782"/>
+                  </a:lnTo>
+                  <a:lnTo>
+                    <a:pt x="5524" y="12829"/>
+                  </a:lnTo>
+                  <a:lnTo>
+                    <a:pt x="5524" y="12829"/>
+                  </a:lnTo>
+                  <a:lnTo>
+                    <a:pt x="4200" y="14152"/>
+                  </a:lnTo>
+                  <a:cubicBezTo>
+                    <a:pt x="3995" y="13490"/>
+                    <a:pt x="3904" y="12829"/>
+                    <a:pt x="3904" y="12075"/>
+                  </a:cubicBezTo>
+                  <a:cubicBezTo>
+                    <a:pt x="3904" y="7419"/>
+                    <a:pt x="7715" y="3607"/>
+                    <a:pt x="12463" y="3607"/>
+                  </a:cubicBezTo>
+                  <a:cubicBezTo>
+                    <a:pt x="17119" y="3607"/>
+                    <a:pt x="20931" y="7419"/>
+                    <a:pt x="20931" y="12075"/>
+                  </a:cubicBezTo>
+                  <a:cubicBezTo>
+                    <a:pt x="20931" y="16732"/>
+                    <a:pt x="17325" y="20429"/>
+                    <a:pt x="12760" y="20635"/>
+                  </a:cubicBezTo>
+                  <a:lnTo>
+                    <a:pt x="12760" y="24150"/>
+                  </a:lnTo>
+                  <a:cubicBezTo>
+                    <a:pt x="19311" y="23967"/>
+                    <a:pt x="24538" y="18626"/>
+                    <a:pt x="24538" y="12075"/>
+                  </a:cubicBezTo>
+                  <a:cubicBezTo>
+                    <a:pt x="24538" y="5410"/>
+                    <a:pt x="19128" y="1"/>
+                    <a:pt x="12463" y="1"/>
+                  </a:cubicBezTo>
+                  <a:close/>
+                </a:path>
+              </a:pathLst>
+            </a:custGeom>
+            <a:solidFill>
+              <a:schemeClr val="accent1"/>
+            </a:solidFill>
+            <a:ln>
+              <a:noFill/>
+            </a:ln>
+          </p:spPr>
+          <p:txBody>
+            <a:bodyPr spcFirstLastPara="1" wrap="square" lIns="91425" tIns="91425" rIns="91425" bIns="91425" anchor="ctr" anchorCtr="0">
+              <a:noAutofit/>
+            </a:bodyPr>
+            <a:lstStyle/>
+            <a:p>
+              <a:pPr marL="0" lvl="0" indent="0" algn="l" rtl="0">
+                <a:spcBef>
+                  <a:spcPts val="0"/>
+                </a:spcBef>
+                <a:spcAft>
+                  <a:spcPts val="0"/>
+                </a:spcAft>
+                <a:buNone/>
+              </a:pPr>
+              <a:endParaRPr/>
+            </a:p>
+          </p:txBody>
+        </p:sp>
+        <p:sp>
+          <p:nvSpPr>
+            <p:cNvPr id="7" name="Google Shape;125;p18">
+              <a:extLst>
+                <a:ext uri="{FF2B5EF4-FFF2-40B4-BE49-F238E27FC236}">
+                  <a16:creationId xmlns:a16="http://schemas.microsoft.com/office/drawing/2014/main" id="{2E6864E2-CD07-1348-B90B-5A6F7B2829FB}"/>
+                </a:ext>
+              </a:extLst>
+            </p:cNvPr>
+            <p:cNvSpPr/>
+            <p:nvPr/>
+          </p:nvSpPr>
+          <p:spPr>
+            <a:xfrm rot="21385122">
+              <a:off x="7138045" y="4160058"/>
+              <a:ext cx="1840010" cy="989236"/>
+            </a:xfrm>
+            <a:custGeom>
+              <a:avLst/>
+              <a:gdLst/>
+              <a:ahLst/>
+              <a:cxnLst/>
+              <a:rect l="l" t="t" r="r" b="b"/>
+              <a:pathLst>
+                <a:path w="16093" h="8652" extrusionOk="0">
+                  <a:moveTo>
+                    <a:pt x="2489" y="1"/>
+                  </a:moveTo>
+                  <a:lnTo>
+                    <a:pt x="1" y="2763"/>
+                  </a:lnTo>
+                  <a:cubicBezTo>
+                    <a:pt x="2101" y="5981"/>
+                    <a:pt x="5707" y="8172"/>
+                    <a:pt x="9907" y="8264"/>
+                  </a:cubicBezTo>
+                  <a:cubicBezTo>
+                    <a:pt x="11619" y="8264"/>
+                    <a:pt x="13331" y="7898"/>
+                    <a:pt x="14746" y="7328"/>
+                  </a:cubicBezTo>
+                  <a:lnTo>
+                    <a:pt x="16093" y="8652"/>
+                  </a:lnTo>
+                  <a:lnTo>
+                    <a:pt x="15705" y="3699"/>
+                  </a:lnTo>
+                  <a:lnTo>
+                    <a:pt x="10752" y="3128"/>
+                  </a:lnTo>
+                  <a:lnTo>
+                    <a:pt x="11984" y="4475"/>
+                  </a:lnTo>
+                  <a:cubicBezTo>
+                    <a:pt x="11414" y="4657"/>
+                    <a:pt x="10660" y="4657"/>
+                    <a:pt x="9998" y="4657"/>
+                  </a:cubicBezTo>
+                  <a:cubicBezTo>
+                    <a:pt x="6666" y="4657"/>
+                    <a:pt x="3904" y="2763"/>
+                    <a:pt x="2489" y="1"/>
+                  </a:cubicBezTo>
+                  <a:close/>
+                </a:path>
+              </a:pathLst>
+            </a:custGeom>
+            <a:solidFill>
+              <a:schemeClr val="accent1"/>
+            </a:solidFill>
+            <a:ln>
+              <a:noFill/>
+            </a:ln>
+          </p:spPr>
+          <p:txBody>
+            <a:bodyPr spcFirstLastPara="1" wrap="square" lIns="91425" tIns="91425" rIns="91425" bIns="91425" anchor="ctr" anchorCtr="0">
+              <a:noAutofit/>
+            </a:bodyPr>
+            <a:lstStyle/>
+            <a:p>
+              <a:pPr marL="0" lvl="0" indent="0" algn="l" rtl="0">
+                <a:spcBef>
+                  <a:spcPts val="0"/>
+                </a:spcBef>
+                <a:spcAft>
+                  <a:spcPts val="0"/>
+                </a:spcAft>
+                <a:buNone/>
+              </a:pPr>
+              <a:endParaRPr dirty="0"/>
+            </a:p>
+          </p:txBody>
+        </p:sp>
+        <p:sp>
+          <p:nvSpPr>
+            <p:cNvPr id="8" name="Google Shape;127;p18">
+              <a:extLst>
+                <a:ext uri="{FF2B5EF4-FFF2-40B4-BE49-F238E27FC236}">
+                  <a16:creationId xmlns:a16="http://schemas.microsoft.com/office/drawing/2014/main" id="{5E55F348-0868-F742-CDDA-52687356B1F9}"/>
+                </a:ext>
+              </a:extLst>
+            </p:cNvPr>
+            <p:cNvSpPr/>
+            <p:nvPr/>
+          </p:nvSpPr>
+          <p:spPr>
+            <a:xfrm>
+              <a:off x="4591186" y="4436308"/>
+              <a:ext cx="1670776" cy="368009"/>
+            </a:xfrm>
+            <a:custGeom>
+              <a:avLst/>
+              <a:gdLst/>
+              <a:ahLst/>
+              <a:cxnLst/>
+              <a:rect l="l" t="t" r="r" b="b"/>
+              <a:pathLst>
+                <a:path w="26433" h="3516" extrusionOk="0">
+                  <a:moveTo>
+                    <a:pt x="1" y="1"/>
+                  </a:moveTo>
+                  <a:lnTo>
+                    <a:pt x="1" y="3516"/>
+                  </a:lnTo>
+                  <a:lnTo>
+                    <a:pt x="26432" y="3516"/>
+                  </a:lnTo>
+                  <a:lnTo>
+                    <a:pt x="26432" y="1"/>
+                  </a:lnTo>
+                  <a:close/>
+                </a:path>
+              </a:pathLst>
+            </a:custGeom>
+            <a:solidFill>
+              <a:schemeClr val="accent1"/>
+            </a:solidFill>
+            <a:ln>
+              <a:noFill/>
+            </a:ln>
+          </p:spPr>
+          <p:txBody>
+            <a:bodyPr spcFirstLastPara="1" wrap="square" lIns="91425" tIns="91425" rIns="91425" bIns="91425" anchor="ctr" anchorCtr="0">
+              <a:noAutofit/>
+            </a:bodyPr>
+            <a:lstStyle/>
+            <a:p>
+              <a:pPr marL="0" lvl="0" indent="0" algn="l" rtl="0">
+                <a:spcBef>
+                  <a:spcPts val="0"/>
+                </a:spcBef>
+                <a:spcAft>
+                  <a:spcPts val="0"/>
+                </a:spcAft>
+                <a:buNone/>
+              </a:pPr>
+              <a:endParaRPr/>
+            </a:p>
+          </p:txBody>
+        </p:sp>
+        <p:sp>
+          <p:nvSpPr>
+            <p:cNvPr id="9" name="Arrow: Right 8">
+              <a:extLst>
+                <a:ext uri="{FF2B5EF4-FFF2-40B4-BE49-F238E27FC236}">
+                  <a16:creationId xmlns:a16="http://schemas.microsoft.com/office/drawing/2014/main" id="{B3E8DFCB-967B-761B-3887-39D5636ACDC4}"/>
+                </a:ext>
+              </a:extLst>
+            </p:cNvPr>
+            <p:cNvSpPr/>
+            <p:nvPr/>
+          </p:nvSpPr>
+          <p:spPr>
+            <a:xfrm>
+              <a:off x="2408392" y="4349858"/>
+              <a:ext cx="846983" cy="552615"/>
+            </a:xfrm>
+            <a:prstGeom prst="rightArrow">
+              <a:avLst/>
+            </a:prstGeom>
+          </p:spPr>
+          <p:style>
+            <a:lnRef idx="2">
+              <a:schemeClr val="accent1">
+                <a:shade val="15000"/>
+              </a:schemeClr>
+            </a:lnRef>
+            <a:fillRef idx="1">
+              <a:schemeClr val="accent1"/>
+            </a:fillRef>
+            <a:effectRef idx="0">
+              <a:schemeClr val="accent1"/>
+            </a:effectRef>
+            <a:fontRef idx="minor">
+              <a:schemeClr val="lt1"/>
+            </a:fontRef>
+          </p:style>
+          <p:txBody>
+            <a:bodyPr rtlCol="0" anchor="ctr"/>
+            <a:lstStyle/>
+            <a:p>
+              <a:pPr algn="ctr"/>
+              <a:endParaRPr lang="en-GB"/>
+            </a:p>
+          </p:txBody>
+        </p:sp>
+        <p:sp>
+          <p:nvSpPr>
+            <p:cNvPr id="10" name="TextBox 9">
+              <a:extLst>
+                <a:ext uri="{FF2B5EF4-FFF2-40B4-BE49-F238E27FC236}">
+                  <a16:creationId xmlns:a16="http://schemas.microsoft.com/office/drawing/2014/main" id="{2F40ACC3-14FF-702B-C08B-4442E75E2601}"/>
+                </a:ext>
+              </a:extLst>
+            </p:cNvPr>
+            <p:cNvSpPr txBox="1"/>
+            <p:nvPr/>
+          </p:nvSpPr>
+          <p:spPr>
+            <a:xfrm>
+              <a:off x="5624106" y="3278777"/>
+              <a:ext cx="1053885" cy="523220"/>
+            </a:xfrm>
+            <a:prstGeom prst="rect">
+              <a:avLst/>
+            </a:prstGeom>
+            <a:noFill/>
+          </p:spPr>
+          <p:txBody>
+            <a:bodyPr wrap="square" rtlCol="0">
+              <a:spAutoFit/>
+            </a:bodyPr>
+            <a:lstStyle/>
+            <a:p>
+              <a:r>
+                <a:rPr lang="en-GB" sz="2800" dirty="0">
+                  <a:latin typeface="+mj-lt"/>
+                </a:rPr>
+                <a:t>Sprint</a:t>
+              </a:r>
+            </a:p>
+          </p:txBody>
+        </p:sp>
+      </p:grpSp>
+    </p:spTree>
+    <p:extLst>
+      <p:ext uri="{BB962C8B-B14F-4D97-AF65-F5344CB8AC3E}">
+        <p14:creationId xmlns:p14="http://schemas.microsoft.com/office/powerpoint/2010/main" val="1746863634"/>
       </p:ext>
     </p:extLst>
   </p:cSld>

</xml_diff>